<commit_message>
[db] Add ppt for CRUD
</commit_message>
<xml_diff>
--- a/db/mongodb/2017/materials/MongoDB_CH2_CRUD.pptx
+++ b/db/mongodb/2017/materials/MongoDB_CH2_CRUD.pptx
@@ -8,7 +8,7 @@
     <p:sldMasterId id="2147483652" r:id="rId7"/>
   </p:sldMasterIdLst>
   <p:notesMasterIdLst>
-    <p:notesMasterId r:id="rId27"/>
+    <p:notesMasterId r:id="rId29"/>
   </p:notesMasterIdLst>
   <p:sldIdLst>
     <p:sldId id="281" r:id="rId8"/>
@@ -28,8 +28,10 @@
     <p:sldId id="408" r:id="rId22"/>
     <p:sldId id="409" r:id="rId23"/>
     <p:sldId id="410" r:id="rId24"/>
-    <p:sldId id="264" r:id="rId25"/>
-    <p:sldId id="265" r:id="rId26"/>
+    <p:sldId id="411" r:id="rId25"/>
+    <p:sldId id="412" r:id="rId26"/>
+    <p:sldId id="264" r:id="rId27"/>
+    <p:sldId id="265" r:id="rId28"/>
   </p:sldIdLst>
   <p:sldSz cx="9144000" cy="6858000" type="screen4x3"/>
   <p:notesSz cx="6858000" cy="9144000"/>
@@ -230,7 +232,7 @@
             <a:fld id="{97373330-0875-4F54-B846-34A9C5D83194}" type="datetimeFigureOut">
               <a:rPr lang="en-US" smtClean="0"/>
               <a:pPr/>
-              <a:t>7/6/2017</a:t>
+              <a:t>7/24/2017</a:t>
             </a:fld>
             <a:endParaRPr lang="en-US"/>
           </a:p>
@@ -10417,11 +10419,1506 @@
           <a:chExt cx="0" cy="0"/>
         </a:xfrm>
       </p:grpSpPr>
+      <p:sp>
+        <p:nvSpPr>
+          <p:cNvPr id="2" name="Text Placeholder 1"/>
+          <p:cNvSpPr>
+            <a:spLocks noGrp="1"/>
+          </p:cNvSpPr>
+          <p:nvPr>
+            <p:ph type="body" sz="quarter" idx="13"/>
+          </p:nvPr>
+        </p:nvSpPr>
+        <p:spPr/>
+        <p:txBody>
+          <a:bodyPr/>
+          <a:lstStyle/>
+          <a:p>
+            <a:r>
+              <a:rPr lang="en-US" dirty="0"/>
+              <a:t>3</a:t>
+            </a:r>
+          </a:p>
+        </p:txBody>
+      </p:sp>
+      <p:sp>
+        <p:nvSpPr>
+          <p:cNvPr id="3" name="Text Placeholder 2"/>
+          <p:cNvSpPr>
+            <a:spLocks noGrp="1"/>
+          </p:cNvSpPr>
+          <p:nvPr>
+            <p:ph type="body" sz="quarter" idx="14"/>
+          </p:nvPr>
+        </p:nvSpPr>
+        <p:spPr/>
+        <p:txBody>
+          <a:bodyPr/>
+          <a:lstStyle/>
+          <a:p>
+            <a:r>
+              <a:rPr lang="en-US" altLang="zh-CN" dirty="0"/>
+              <a:t>Update</a:t>
+            </a:r>
+          </a:p>
+          <a:p>
+            <a:endParaRPr lang="en-US" dirty="0"/>
+          </a:p>
+          <a:p>
+            <a:endParaRPr lang="en-US" dirty="0"/>
+          </a:p>
+        </p:txBody>
+      </p:sp>
+      <p:sp>
+        <p:nvSpPr>
+          <p:cNvPr id="7" name="TextBox 2"/>
+          <p:cNvSpPr txBox="1">
+            <a:spLocks noChangeArrowheads="1"/>
+          </p:cNvSpPr>
+          <p:nvPr/>
+        </p:nvSpPr>
+        <p:spPr bwMode="auto">
+          <a:xfrm>
+            <a:off x="197643" y="1066800"/>
+            <a:ext cx="8824913" cy="954107"/>
+          </a:xfrm>
+          <a:prstGeom prst="rect">
+            <a:avLst/>
+          </a:prstGeom>
+          <a:noFill/>
+          <a:ln w="9525">
+            <a:noFill/>
+            <a:miter lim="800000"/>
+            <a:headEnd/>
+            <a:tailEnd/>
+          </a:ln>
+        </p:spPr>
+        <p:txBody>
+          <a:bodyPr>
+            <a:spAutoFit/>
+          </a:bodyPr>
+          <a:lstStyle>
+            <a:lvl1pPr eaLnBrk="0" hangingPunct="0">
+              <a:defRPr>
+                <a:solidFill>
+                  <a:schemeClr val="tx1"/>
+                </a:solidFill>
+                <a:latin typeface="Arial" charset="0"/>
+                <a:ea typeface="宋体" pitchFamily="2" charset="-122"/>
+              </a:defRPr>
+            </a:lvl1pPr>
+            <a:lvl2pPr marL="742950" indent="-285750" eaLnBrk="0" hangingPunct="0">
+              <a:defRPr>
+                <a:solidFill>
+                  <a:schemeClr val="tx1"/>
+                </a:solidFill>
+                <a:latin typeface="Arial" charset="0"/>
+                <a:ea typeface="宋体" pitchFamily="2" charset="-122"/>
+              </a:defRPr>
+            </a:lvl2pPr>
+            <a:lvl3pPr marL="1143000" indent="-228600" eaLnBrk="0" hangingPunct="0">
+              <a:defRPr>
+                <a:solidFill>
+                  <a:schemeClr val="tx1"/>
+                </a:solidFill>
+                <a:latin typeface="Arial" charset="0"/>
+                <a:ea typeface="宋体" pitchFamily="2" charset="-122"/>
+              </a:defRPr>
+            </a:lvl3pPr>
+            <a:lvl4pPr marL="1600200" indent="-228600" eaLnBrk="0" hangingPunct="0">
+              <a:defRPr>
+                <a:solidFill>
+                  <a:schemeClr val="tx1"/>
+                </a:solidFill>
+                <a:latin typeface="Arial" charset="0"/>
+                <a:ea typeface="宋体" pitchFamily="2" charset="-122"/>
+              </a:defRPr>
+            </a:lvl4pPr>
+            <a:lvl5pPr marL="2057400" indent="-228600" eaLnBrk="0" hangingPunct="0">
+              <a:defRPr>
+                <a:solidFill>
+                  <a:schemeClr val="tx1"/>
+                </a:solidFill>
+                <a:latin typeface="Arial" charset="0"/>
+                <a:ea typeface="宋体" pitchFamily="2" charset="-122"/>
+              </a:defRPr>
+            </a:lvl5pPr>
+            <a:lvl6pPr marL="2514600" indent="-228600" eaLnBrk="0" fontAlgn="base" hangingPunct="0">
+              <a:spcBef>
+                <a:spcPct val="0"/>
+              </a:spcBef>
+              <a:spcAft>
+                <a:spcPct val="0"/>
+              </a:spcAft>
+              <a:defRPr>
+                <a:solidFill>
+                  <a:schemeClr val="tx1"/>
+                </a:solidFill>
+                <a:latin typeface="Arial" charset="0"/>
+                <a:ea typeface="宋体" pitchFamily="2" charset="-122"/>
+              </a:defRPr>
+            </a:lvl6pPr>
+            <a:lvl7pPr marL="2971800" indent="-228600" eaLnBrk="0" fontAlgn="base" hangingPunct="0">
+              <a:spcBef>
+                <a:spcPct val="0"/>
+              </a:spcBef>
+              <a:spcAft>
+                <a:spcPct val="0"/>
+              </a:spcAft>
+              <a:defRPr>
+                <a:solidFill>
+                  <a:schemeClr val="tx1"/>
+                </a:solidFill>
+                <a:latin typeface="Arial" charset="0"/>
+                <a:ea typeface="宋体" pitchFamily="2" charset="-122"/>
+              </a:defRPr>
+            </a:lvl7pPr>
+            <a:lvl8pPr marL="3429000" indent="-228600" eaLnBrk="0" fontAlgn="base" hangingPunct="0">
+              <a:spcBef>
+                <a:spcPct val="0"/>
+              </a:spcBef>
+              <a:spcAft>
+                <a:spcPct val="0"/>
+              </a:spcAft>
+              <a:defRPr>
+                <a:solidFill>
+                  <a:schemeClr val="tx1"/>
+                </a:solidFill>
+                <a:latin typeface="Arial" charset="0"/>
+                <a:ea typeface="宋体" pitchFamily="2" charset="-122"/>
+              </a:defRPr>
+            </a:lvl8pPr>
+            <a:lvl9pPr marL="3886200" indent="-228600" eaLnBrk="0" fontAlgn="base" hangingPunct="0">
+              <a:spcBef>
+                <a:spcPct val="0"/>
+              </a:spcBef>
+              <a:spcAft>
+                <a:spcPct val="0"/>
+              </a:spcAft>
+              <a:defRPr>
+                <a:solidFill>
+                  <a:schemeClr val="tx1"/>
+                </a:solidFill>
+                <a:latin typeface="Arial" charset="0"/>
+                <a:ea typeface="宋体" pitchFamily="2" charset="-122"/>
+              </a:defRPr>
+            </a:lvl9pPr>
+          </a:lstStyle>
+          <a:p>
+            <a:pPr eaLnBrk="1" hangingPunct="1"/>
+            <a:r>
+              <a:rPr lang="en-US" altLang="zh-CN" sz="2800" dirty="0">
+                <a:latin typeface="微软雅黑" panose="020B0503020204020204" pitchFamily="34" charset="-122"/>
+                <a:ea typeface="微软雅黑" panose="020B0503020204020204" pitchFamily="34" charset="-122"/>
+              </a:rPr>
+              <a:t>Compare MongoDB to SQL:</a:t>
+            </a:r>
+          </a:p>
+          <a:p>
+            <a:pPr eaLnBrk="1" hangingPunct="1"/>
+            <a:endParaRPr lang="en-US" altLang="zh-CN" sz="2800" dirty="0">
+              <a:solidFill>
+                <a:schemeClr val="bg1"/>
+              </a:solidFill>
+              <a:latin typeface="微软雅黑" pitchFamily="34" charset="-122"/>
+              <a:ea typeface="微软雅黑" pitchFamily="34" charset="-122"/>
+            </a:endParaRPr>
+          </a:p>
+        </p:txBody>
+      </p:sp>
+      <p:graphicFrame>
+        <p:nvGraphicFramePr>
+          <p:cNvPr id="5" name="Table 4"/>
+          <p:cNvGraphicFramePr>
+            <a:graphicFrameLocks noGrp="1"/>
+          </p:cNvGraphicFramePr>
+          <p:nvPr>
+            <p:extLst>
+              <p:ext uri="{D42A27DB-BD31-4B8C-83A1-F6EECF244321}">
+                <p14:modId xmlns:p14="http://schemas.microsoft.com/office/powerpoint/2010/main" val="1413796120"/>
+              </p:ext>
+            </p:extLst>
+          </p:nvPr>
+        </p:nvGraphicFramePr>
+        <p:xfrm>
+          <a:off x="0" y="1844675"/>
+          <a:ext cx="9144000" cy="5174286"/>
+        </p:xfrm>
+        <a:graphic>
+          <a:graphicData uri="http://schemas.openxmlformats.org/drawingml/2006/table">
+            <a:tbl>
+              <a:tblPr/>
+              <a:tblGrid>
+                <a:gridCol w="1752600">
+                  <a:extLst>
+                    <a:ext uri="{9D8B030D-6E8A-4147-A177-3AD203B41FA5}">
+                      <a16:colId xmlns:a16="http://schemas.microsoft.com/office/drawing/2014/main" val="20000"/>
+                    </a:ext>
+                  </a:extLst>
+                </a:gridCol>
+                <a:gridCol w="7391400">
+                  <a:extLst>
+                    <a:ext uri="{9D8B030D-6E8A-4147-A177-3AD203B41FA5}">
+                      <a16:colId xmlns:a16="http://schemas.microsoft.com/office/drawing/2014/main" val="20001"/>
+                    </a:ext>
+                  </a:extLst>
+                </a:gridCol>
+              </a:tblGrid>
+              <a:tr h="742950">
+                <a:tc>
+                  <a:txBody>
+                    <a:bodyPr/>
+                    <a:lstStyle/>
+                    <a:p>
+                      <a:pPr marL="0" marR="0" lvl="0" indent="0" algn="ctr" defTabSz="914400" rtl="0" eaLnBrk="1" fontAlgn="base" latinLnBrk="0" hangingPunct="1">
+                        <a:lnSpc>
+                          <a:spcPct val="100000"/>
+                        </a:lnSpc>
+                        <a:spcBef>
+                          <a:spcPct val="0"/>
+                        </a:spcBef>
+                        <a:spcAft>
+                          <a:spcPct val="0"/>
+                        </a:spcAft>
+                        <a:buClrTx/>
+                        <a:buSzTx/>
+                        <a:buFontTx/>
+                        <a:buNone/>
+                        <a:tabLst/>
+                      </a:pPr>
+                      <a:endParaRPr kumimoji="0" lang="en-US" altLang="en-US" sz="2400" b="1" i="0" u="none" strike="noStrike" cap="none" normalizeH="0" baseline="0" dirty="0">
+                        <a:ln>
+                          <a:noFill/>
+                        </a:ln>
+                        <a:solidFill>
+                          <a:schemeClr val="tx1"/>
+                        </a:solidFill>
+                        <a:effectLst/>
+                        <a:latin typeface="微软雅黑" pitchFamily="34" charset="-122"/>
+                        <a:ea typeface="微软雅黑" pitchFamily="34" charset="-122"/>
+                      </a:endParaRPr>
+                    </a:p>
+                  </a:txBody>
+                  <a:tcPr horzOverflow="overflow">
+                    <a:lnL w="12700" cap="flat" cmpd="sng" algn="ctr">
+                      <a:solidFill>
+                        <a:schemeClr val="tx1"/>
+                      </a:solidFill>
+                      <a:prstDash val="solid"/>
+                      <a:round/>
+                      <a:headEnd type="none" w="med" len="med"/>
+                      <a:tailEnd type="none" w="med" len="med"/>
+                    </a:lnL>
+                    <a:lnR w="12700" cap="flat" cmpd="sng" algn="ctr">
+                      <a:solidFill>
+                        <a:schemeClr val="tx1"/>
+                      </a:solidFill>
+                      <a:prstDash val="solid"/>
+                      <a:round/>
+                      <a:headEnd type="none" w="med" len="med"/>
+                      <a:tailEnd type="none" w="med" len="med"/>
+                    </a:lnR>
+                    <a:lnT w="12700" cap="flat" cmpd="sng" algn="ctr">
+                      <a:solidFill>
+                        <a:schemeClr val="tx1"/>
+                      </a:solidFill>
+                      <a:prstDash val="solid"/>
+                      <a:round/>
+                      <a:headEnd type="none" w="med" len="med"/>
+                      <a:tailEnd type="none" w="med" len="med"/>
+                    </a:lnT>
+                    <a:lnB w="12700" cap="flat" cmpd="sng" algn="ctr">
+                      <a:solidFill>
+                        <a:schemeClr val="tx1"/>
+                      </a:solidFill>
+                      <a:prstDash val="solid"/>
+                      <a:round/>
+                      <a:headEnd type="none" w="med" len="med"/>
+                      <a:tailEnd type="none" w="med" len="med"/>
+                    </a:lnB>
+                    <a:lnTlToBr>
+                      <a:noFill/>
+                    </a:lnTlToBr>
+                    <a:lnBlToTr>
+                      <a:noFill/>
+                    </a:lnBlToTr>
+                    <a:solidFill>
+                      <a:schemeClr val="accent1"/>
+                    </a:solidFill>
+                  </a:tcPr>
+                </a:tc>
+                <a:tc>
+                  <a:txBody>
+                    <a:bodyPr/>
+                    <a:lstStyle/>
+                    <a:p>
+                      <a:pPr marL="0" marR="0" lvl="0" indent="0" algn="ctr" defTabSz="914400" rtl="0" eaLnBrk="1" fontAlgn="base" latinLnBrk="0" hangingPunct="1">
+                        <a:lnSpc>
+                          <a:spcPct val="100000"/>
+                        </a:lnSpc>
+                        <a:spcBef>
+                          <a:spcPct val="0"/>
+                        </a:spcBef>
+                        <a:spcAft>
+                          <a:spcPct val="0"/>
+                        </a:spcAft>
+                        <a:buClrTx/>
+                        <a:buSzTx/>
+                        <a:buFontTx/>
+                        <a:buNone/>
+                        <a:tabLst/>
+                      </a:pPr>
+                      <a:r>
+                        <a:rPr kumimoji="0" lang="en-US" sz="2400" b="1" i="0" u="none" strike="noStrike" cap="none" normalizeH="0" baseline="0" dirty="0">
+                          <a:ln>
+                            <a:noFill/>
+                          </a:ln>
+                          <a:solidFill>
+                            <a:schemeClr val="tx1"/>
+                          </a:solidFill>
+                          <a:effectLst/>
+                          <a:latin typeface="微软雅黑" pitchFamily="34" charset="-122"/>
+                          <a:ea typeface="微软雅黑" pitchFamily="34" charset="-122"/>
+                        </a:rPr>
+                        <a:t>Syntax Rules</a:t>
+                      </a:r>
+                    </a:p>
+                  </a:txBody>
+                  <a:tcPr horzOverflow="overflow">
+                    <a:lnL w="12700" cap="flat" cmpd="sng" algn="ctr">
+                      <a:solidFill>
+                        <a:schemeClr val="tx1"/>
+                      </a:solidFill>
+                      <a:prstDash val="solid"/>
+                      <a:round/>
+                      <a:headEnd type="none" w="med" len="med"/>
+                      <a:tailEnd type="none" w="med" len="med"/>
+                    </a:lnL>
+                    <a:lnR w="12700" cap="flat" cmpd="sng" algn="ctr">
+                      <a:solidFill>
+                        <a:schemeClr val="tx1"/>
+                      </a:solidFill>
+                      <a:prstDash val="solid"/>
+                      <a:round/>
+                      <a:headEnd type="none" w="med" len="med"/>
+                      <a:tailEnd type="none" w="med" len="med"/>
+                    </a:lnR>
+                    <a:lnT w="12700" cap="flat" cmpd="sng" algn="ctr">
+                      <a:solidFill>
+                        <a:schemeClr val="tx1"/>
+                      </a:solidFill>
+                      <a:prstDash val="solid"/>
+                      <a:round/>
+                      <a:headEnd type="none" w="med" len="med"/>
+                      <a:tailEnd type="none" w="med" len="med"/>
+                    </a:lnT>
+                    <a:lnB w="12700" cap="flat" cmpd="sng" algn="ctr">
+                      <a:solidFill>
+                        <a:schemeClr val="tx1"/>
+                      </a:solidFill>
+                      <a:prstDash val="solid"/>
+                      <a:round/>
+                      <a:headEnd type="none" w="med" len="med"/>
+                      <a:tailEnd type="none" w="med" len="med"/>
+                    </a:lnB>
+                    <a:lnTlToBr>
+                      <a:noFill/>
+                    </a:lnTlToBr>
+                    <a:lnBlToTr>
+                      <a:noFill/>
+                    </a:lnBlToTr>
+                    <a:solidFill>
+                      <a:schemeClr val="accent1"/>
+                    </a:solidFill>
+                  </a:tcPr>
+                </a:tc>
+                <a:extLst>
+                  <a:ext uri="{0D108BD9-81ED-4DB2-BD59-A6C34878D82A}">
+                    <a16:rowId xmlns:a16="http://schemas.microsoft.com/office/drawing/2014/main" val="10000"/>
+                  </a:ext>
+                </a:extLst>
+              </a:tr>
+              <a:tr h="2490788">
+                <a:tc>
+                  <a:txBody>
+                    <a:bodyPr/>
+                    <a:lstStyle/>
+                    <a:p>
+                      <a:pPr marL="0" marR="0" lvl="0" indent="0" algn="ctr" defTabSz="914400" rtl="0" eaLnBrk="1" fontAlgn="base" latinLnBrk="0" hangingPunct="1">
+                        <a:lnSpc>
+                          <a:spcPct val="100000"/>
+                        </a:lnSpc>
+                        <a:spcBef>
+                          <a:spcPct val="0"/>
+                        </a:spcBef>
+                        <a:spcAft>
+                          <a:spcPct val="0"/>
+                        </a:spcAft>
+                        <a:buClrTx/>
+                        <a:buSzTx/>
+                        <a:buFontTx/>
+                        <a:buNone/>
+                        <a:tabLst/>
+                      </a:pPr>
+                      <a:r>
+                        <a:rPr kumimoji="0" lang="en-US" altLang="zh-CN" sz="2400" b="0" i="0" u="none" strike="noStrike" cap="none" normalizeH="0" baseline="0" dirty="0">
+                          <a:ln>
+                            <a:noFill/>
+                          </a:ln>
+                          <a:solidFill>
+                            <a:srgbClr val="000000"/>
+                          </a:solidFill>
+                          <a:effectLst/>
+                          <a:latin typeface="微软雅黑" pitchFamily="34" charset="-122"/>
+                          <a:ea typeface="微软雅黑" pitchFamily="34" charset="-122"/>
+                        </a:rPr>
+                        <a:t>MongoDB</a:t>
+                      </a:r>
+                      <a:endParaRPr kumimoji="0" lang="en-US" sz="2400" b="0" i="0" u="none" strike="noStrike" cap="none" normalizeH="0" baseline="0" dirty="0">
+                        <a:ln>
+                          <a:noFill/>
+                        </a:ln>
+                        <a:solidFill>
+                          <a:srgbClr val="000000"/>
+                        </a:solidFill>
+                        <a:effectLst/>
+                        <a:latin typeface="微软雅黑" pitchFamily="34" charset="-122"/>
+                        <a:ea typeface="微软雅黑" pitchFamily="34" charset="-122"/>
+                      </a:endParaRPr>
+                    </a:p>
+                  </a:txBody>
+                  <a:tcPr marT="45714" marB="45714" horzOverflow="overflow">
+                    <a:lnL w="12700" cap="flat" cmpd="sng" algn="ctr">
+                      <a:solidFill>
+                        <a:schemeClr val="tx1"/>
+                      </a:solidFill>
+                      <a:prstDash val="solid"/>
+                      <a:round/>
+                      <a:headEnd type="none" w="med" len="med"/>
+                      <a:tailEnd type="none" w="med" len="med"/>
+                    </a:lnL>
+                    <a:lnR w="12700" cap="flat" cmpd="sng" algn="ctr">
+                      <a:solidFill>
+                        <a:schemeClr val="tx1"/>
+                      </a:solidFill>
+                      <a:prstDash val="solid"/>
+                      <a:round/>
+                      <a:headEnd type="none" w="med" len="med"/>
+                      <a:tailEnd type="none" w="med" len="med"/>
+                    </a:lnR>
+                    <a:lnT w="12700" cap="flat" cmpd="sng" algn="ctr">
+                      <a:solidFill>
+                        <a:schemeClr val="tx1"/>
+                      </a:solidFill>
+                      <a:prstDash val="solid"/>
+                      <a:round/>
+                      <a:headEnd type="none" w="med" len="med"/>
+                      <a:tailEnd type="none" w="med" len="med"/>
+                    </a:lnT>
+                    <a:lnB w="12700" cap="flat" cmpd="sng" algn="ctr">
+                      <a:solidFill>
+                        <a:schemeClr val="tx1"/>
+                      </a:solidFill>
+                      <a:prstDash val="solid"/>
+                      <a:round/>
+                      <a:headEnd type="none" w="med" len="med"/>
+                      <a:tailEnd type="none" w="med" len="med"/>
+                    </a:lnB>
+                    <a:lnTlToBr>
+                      <a:noFill/>
+                    </a:lnTlToBr>
+                    <a:lnBlToTr>
+                      <a:noFill/>
+                    </a:lnBlToTr>
+                    <a:solidFill>
+                      <a:srgbClr val="E7F3F4"/>
+                    </a:solidFill>
+                  </a:tcPr>
+                </a:tc>
+                <a:tc>
+                  <a:txBody>
+                    <a:bodyPr/>
+                    <a:lstStyle/>
+                    <a:p>
+                      <a:pPr marL="0" marR="0" lvl="0" indent="0" algn="l" defTabSz="914400" rtl="0" eaLnBrk="1" fontAlgn="base" latinLnBrk="0" hangingPunct="1">
+                        <a:lnSpc>
+                          <a:spcPct val="100000"/>
+                        </a:lnSpc>
+                        <a:spcBef>
+                          <a:spcPct val="0"/>
+                        </a:spcBef>
+                        <a:spcAft>
+                          <a:spcPct val="0"/>
+                        </a:spcAft>
+                        <a:buClrTx/>
+                        <a:buSzTx/>
+                        <a:buFontTx/>
+                        <a:buNone/>
+                        <a:tabLst/>
+                      </a:pPr>
+                      <a:r>
+                        <a:rPr kumimoji="0" lang="en-US" sz="2800" b="0" i="0" u="none" strike="noStrike" cap="none" normalizeH="0" baseline="0" dirty="0" err="1">
+                          <a:ln>
+                            <a:noFill/>
+                          </a:ln>
+                          <a:solidFill>
+                            <a:srgbClr val="000000"/>
+                          </a:solidFill>
+                          <a:effectLst/>
+                          <a:latin typeface="微软雅黑" pitchFamily="34" charset="-122"/>
+                          <a:ea typeface="微软雅黑" pitchFamily="34" charset="-122"/>
+                        </a:rPr>
+                        <a:t>db.</a:t>
+                      </a:r>
+                      <a:r>
+                        <a:rPr kumimoji="0" lang="en-US" sz="2800" b="1" i="1" u="none" strike="noStrike" cap="none" normalizeH="0" baseline="0" dirty="0" err="1">
+                          <a:ln>
+                            <a:noFill/>
+                          </a:ln>
+                          <a:solidFill>
+                            <a:srgbClr val="000000"/>
+                          </a:solidFill>
+                          <a:effectLst/>
+                          <a:latin typeface="微软雅黑" pitchFamily="34" charset="-122"/>
+                          <a:ea typeface="微软雅黑" pitchFamily="34" charset="-122"/>
+                        </a:rPr>
+                        <a:t>collection</a:t>
+                      </a:r>
+                      <a:r>
+                        <a:rPr kumimoji="0" lang="en-US" sz="2800" b="0" i="0" u="none" strike="noStrike" cap="none" normalizeH="0" baseline="0" dirty="0" err="1">
+                          <a:ln>
+                            <a:noFill/>
+                          </a:ln>
+                          <a:solidFill>
+                            <a:srgbClr val="000000"/>
+                          </a:solidFill>
+                          <a:effectLst/>
+                          <a:latin typeface="微软雅黑" pitchFamily="34" charset="-122"/>
+                          <a:ea typeface="微软雅黑" pitchFamily="34" charset="-122"/>
+                        </a:rPr>
+                        <a:t>.</a:t>
+                      </a:r>
+                      <a:r>
+                        <a:rPr kumimoji="0" lang="en-US" sz="2800" b="1" i="0" u="none" strike="noStrike" cap="none" normalizeH="0" baseline="0" dirty="0" err="1">
+                          <a:ln>
+                            <a:noFill/>
+                          </a:ln>
+                          <a:solidFill>
+                            <a:srgbClr val="FF0000"/>
+                          </a:solidFill>
+                          <a:effectLst/>
+                          <a:latin typeface="微软雅黑" pitchFamily="34" charset="-122"/>
+                          <a:ea typeface="微软雅黑" pitchFamily="34" charset="-122"/>
+                        </a:rPr>
+                        <a:t>updateOne</a:t>
+                      </a:r>
+                      <a:r>
+                        <a:rPr kumimoji="0" lang="en-US" sz="2800" b="0" i="0" u="none" strike="noStrike" cap="none" normalizeH="0" baseline="0" dirty="0">
+                          <a:ln>
+                            <a:noFill/>
+                          </a:ln>
+                          <a:solidFill>
+                            <a:srgbClr val="000000"/>
+                          </a:solidFill>
+                          <a:effectLst/>
+                          <a:latin typeface="微软雅黑" pitchFamily="34" charset="-122"/>
+                          <a:ea typeface="微软雅黑" pitchFamily="34" charset="-122"/>
+                        </a:rPr>
+                        <a:t> (</a:t>
+                      </a:r>
+                    </a:p>
+                    <a:p>
+                      <a:pPr marL="0" marR="0" lvl="0" indent="0" algn="l" defTabSz="914400" rtl="0" eaLnBrk="1" fontAlgn="base" latinLnBrk="0" hangingPunct="1">
+                        <a:lnSpc>
+                          <a:spcPct val="100000"/>
+                        </a:lnSpc>
+                        <a:spcBef>
+                          <a:spcPct val="0"/>
+                        </a:spcBef>
+                        <a:spcAft>
+                          <a:spcPct val="0"/>
+                        </a:spcAft>
+                        <a:buClrTx/>
+                        <a:buSzTx/>
+                        <a:buFontTx/>
+                        <a:buNone/>
+                        <a:tabLst/>
+                      </a:pPr>
+                      <a:r>
+                        <a:rPr kumimoji="0" lang="en-US" sz="2800" b="0" i="0" u="none" strike="noStrike" cap="none" normalizeH="0" baseline="0" dirty="0">
+                          <a:ln>
+                            <a:noFill/>
+                          </a:ln>
+                          <a:solidFill>
+                            <a:srgbClr val="000000"/>
+                          </a:solidFill>
+                          <a:effectLst/>
+                          <a:latin typeface="微软雅黑" pitchFamily="34" charset="-122"/>
+                          <a:ea typeface="微软雅黑" pitchFamily="34" charset="-122"/>
+                        </a:rPr>
+                        <a:t>    {name: “Frye”},  </a:t>
+                      </a:r>
+                      <a:r>
+                        <a:rPr kumimoji="0" lang="en-US" sz="2800" b="1" i="0" u="none" strike="noStrike" cap="none" normalizeH="0" baseline="0" dirty="0">
+                          <a:ln>
+                            <a:noFill/>
+                          </a:ln>
+                          <a:solidFill>
+                            <a:srgbClr val="00B050"/>
+                          </a:solidFill>
+                          <a:effectLst/>
+                          <a:latin typeface="微软雅黑" pitchFamily="34" charset="-122"/>
+                          <a:ea typeface="微软雅黑" pitchFamily="34" charset="-122"/>
+                        </a:rPr>
+                        <a:t>// Filter</a:t>
+                      </a:r>
+                    </a:p>
+                    <a:p>
+                      <a:pPr marL="0" marR="0" lvl="0" indent="0" algn="l" defTabSz="914400" rtl="0" eaLnBrk="1" fontAlgn="base" latinLnBrk="0" hangingPunct="1">
+                        <a:lnSpc>
+                          <a:spcPct val="100000"/>
+                        </a:lnSpc>
+                        <a:spcBef>
+                          <a:spcPct val="0"/>
+                        </a:spcBef>
+                        <a:spcAft>
+                          <a:spcPct val="0"/>
+                        </a:spcAft>
+                        <a:buClrTx/>
+                        <a:buSzTx/>
+                        <a:buFontTx/>
+                        <a:buNone/>
+                        <a:tabLst/>
+                      </a:pPr>
+                      <a:r>
+                        <a:rPr kumimoji="0" lang="en-US" sz="2800" b="0" i="0" u="none" strike="noStrike" cap="none" normalizeH="0" baseline="0" dirty="0">
+                          <a:ln>
+                            <a:noFill/>
+                          </a:ln>
+                          <a:solidFill>
+                            <a:srgbClr val="000000"/>
+                          </a:solidFill>
+                          <a:effectLst/>
+                          <a:latin typeface="微软雅黑" pitchFamily="34" charset="-122"/>
+                          <a:ea typeface="微软雅黑" pitchFamily="34" charset="-122"/>
+                        </a:rPr>
+                        <a:t>    {$set: {age: 21}},  </a:t>
+                      </a:r>
+                      <a:r>
+                        <a:rPr kumimoji="0" lang="en-US" sz="2800" b="1" i="0" u="none" strike="noStrike" cap="none" normalizeH="0" baseline="0" dirty="0">
+                          <a:ln>
+                            <a:noFill/>
+                          </a:ln>
+                          <a:solidFill>
+                            <a:srgbClr val="00B050"/>
+                          </a:solidFill>
+                          <a:effectLst/>
+                          <a:latin typeface="微软雅黑" pitchFamily="34" charset="-122"/>
+                          <a:ea typeface="微软雅黑" pitchFamily="34" charset="-122"/>
+                        </a:rPr>
+                        <a:t>// Update statement</a:t>
+                      </a:r>
+                    </a:p>
+                    <a:p>
+                      <a:pPr marL="0" marR="0" lvl="0" indent="0" algn="l" defTabSz="914400" rtl="0" eaLnBrk="1" fontAlgn="base" latinLnBrk="0" hangingPunct="1">
+                        <a:lnSpc>
+                          <a:spcPct val="100000"/>
+                        </a:lnSpc>
+                        <a:spcBef>
+                          <a:spcPct val="0"/>
+                        </a:spcBef>
+                        <a:spcAft>
+                          <a:spcPct val="0"/>
+                        </a:spcAft>
+                        <a:buClrTx/>
+                        <a:buSzTx/>
+                        <a:buFontTx/>
+                        <a:buNone/>
+                        <a:tabLst/>
+                      </a:pPr>
+                      <a:r>
+                        <a:rPr kumimoji="0" lang="en-US" sz="2800" b="0" i="0" u="none" strike="noStrike" cap="none" normalizeH="0" baseline="0" dirty="0">
+                          <a:ln>
+                            <a:noFill/>
+                          </a:ln>
+                          <a:solidFill>
+                            <a:srgbClr val="000000"/>
+                          </a:solidFill>
+                          <a:effectLst/>
+                          <a:latin typeface="微软雅黑" pitchFamily="34" charset="-122"/>
+                          <a:ea typeface="微软雅黑" pitchFamily="34" charset="-122"/>
+                        </a:rPr>
+                        <a:t>    { </a:t>
+                      </a:r>
+                      <a:r>
+                        <a:rPr kumimoji="0" lang="en-US" sz="2800" b="1" i="0" u="none" strike="noStrike" kern="1200" cap="none" normalizeH="0" baseline="0" dirty="0">
+                          <a:ln>
+                            <a:noFill/>
+                          </a:ln>
+                          <a:solidFill>
+                            <a:srgbClr val="00B050"/>
+                          </a:solidFill>
+                          <a:effectLst/>
+                          <a:latin typeface="微软雅黑" pitchFamily="34" charset="-122"/>
+                          <a:ea typeface="微软雅黑" pitchFamily="34" charset="-122"/>
+                          <a:cs typeface="+mn-cs"/>
+                        </a:rPr>
+                        <a:t>/* Options */ </a:t>
+                      </a:r>
+                      <a:r>
+                        <a:rPr kumimoji="0" lang="en-US" sz="2800" b="0" i="0" u="none" strike="noStrike" cap="none" normalizeH="0" baseline="0" dirty="0">
+                          <a:ln>
+                            <a:noFill/>
+                          </a:ln>
+                          <a:solidFill>
+                            <a:srgbClr val="000000"/>
+                          </a:solidFill>
+                          <a:effectLst/>
+                          <a:latin typeface="微软雅黑" pitchFamily="34" charset="-122"/>
+                          <a:ea typeface="微软雅黑" pitchFamily="34" charset="-122"/>
+                        </a:rPr>
+                        <a:t>}</a:t>
+                      </a:r>
+                    </a:p>
+                    <a:p>
+                      <a:pPr marL="0" marR="0" lvl="0" indent="0" algn="l" defTabSz="914400" rtl="0" eaLnBrk="1" fontAlgn="base" latinLnBrk="0" hangingPunct="1">
+                        <a:lnSpc>
+                          <a:spcPct val="100000"/>
+                        </a:lnSpc>
+                        <a:spcBef>
+                          <a:spcPct val="0"/>
+                        </a:spcBef>
+                        <a:spcAft>
+                          <a:spcPct val="0"/>
+                        </a:spcAft>
+                        <a:buClrTx/>
+                        <a:buSzTx/>
+                        <a:buFontTx/>
+                        <a:buNone/>
+                        <a:tabLst/>
+                      </a:pPr>
+                      <a:r>
+                        <a:rPr kumimoji="0" lang="en-US" sz="2800" b="0" i="0" u="none" strike="noStrike" cap="none" normalizeH="0" baseline="0" dirty="0">
+                          <a:ln>
+                            <a:noFill/>
+                          </a:ln>
+                          <a:solidFill>
+                            <a:srgbClr val="000000"/>
+                          </a:solidFill>
+                          <a:effectLst/>
+                          <a:latin typeface="微软雅黑" pitchFamily="34" charset="-122"/>
+                          <a:ea typeface="微软雅黑" pitchFamily="34" charset="-122"/>
+                        </a:rPr>
+                        <a:t>)</a:t>
+                      </a:r>
+                    </a:p>
+                    <a:p>
+                      <a:pPr marL="0" marR="0" lvl="0" indent="0" algn="l" defTabSz="914400" rtl="0" eaLnBrk="1" fontAlgn="base" latinLnBrk="0" hangingPunct="1">
+                        <a:lnSpc>
+                          <a:spcPct val="100000"/>
+                        </a:lnSpc>
+                        <a:spcBef>
+                          <a:spcPct val="0"/>
+                        </a:spcBef>
+                        <a:spcAft>
+                          <a:spcPct val="0"/>
+                        </a:spcAft>
+                        <a:buClrTx/>
+                        <a:buSzTx/>
+                        <a:buFontTx/>
+                        <a:buNone/>
+                        <a:tabLst/>
+                      </a:pPr>
+                      <a:endParaRPr kumimoji="0" lang="en-US" sz="2800" b="0" i="0" u="none" strike="noStrike" cap="none" normalizeH="0" baseline="0" dirty="0">
+                        <a:ln>
+                          <a:noFill/>
+                        </a:ln>
+                        <a:solidFill>
+                          <a:srgbClr val="000000"/>
+                        </a:solidFill>
+                        <a:effectLst/>
+                        <a:latin typeface="微软雅黑" pitchFamily="34" charset="-122"/>
+                        <a:ea typeface="微软雅黑" pitchFamily="34" charset="-122"/>
+                      </a:endParaRPr>
+                    </a:p>
+                  </a:txBody>
+                  <a:tcPr marT="45714" marB="45714" horzOverflow="overflow">
+                    <a:lnL w="12700" cap="flat" cmpd="sng" algn="ctr">
+                      <a:solidFill>
+                        <a:schemeClr val="tx1"/>
+                      </a:solidFill>
+                      <a:prstDash val="solid"/>
+                      <a:round/>
+                      <a:headEnd type="none" w="med" len="med"/>
+                      <a:tailEnd type="none" w="med" len="med"/>
+                    </a:lnL>
+                    <a:lnR w="12700" cap="flat" cmpd="sng" algn="ctr">
+                      <a:solidFill>
+                        <a:schemeClr val="tx1"/>
+                      </a:solidFill>
+                      <a:prstDash val="solid"/>
+                      <a:round/>
+                      <a:headEnd type="none" w="med" len="med"/>
+                      <a:tailEnd type="none" w="med" len="med"/>
+                    </a:lnR>
+                    <a:lnT w="12700" cap="flat" cmpd="sng" algn="ctr">
+                      <a:solidFill>
+                        <a:schemeClr val="tx1"/>
+                      </a:solidFill>
+                      <a:prstDash val="solid"/>
+                      <a:round/>
+                      <a:headEnd type="none" w="med" len="med"/>
+                      <a:tailEnd type="none" w="med" len="med"/>
+                    </a:lnT>
+                    <a:lnB w="12700" cap="flat" cmpd="sng" algn="ctr">
+                      <a:solidFill>
+                        <a:schemeClr val="tx1"/>
+                      </a:solidFill>
+                      <a:prstDash val="solid"/>
+                      <a:round/>
+                      <a:headEnd type="none" w="med" len="med"/>
+                      <a:tailEnd type="none" w="med" len="med"/>
+                    </a:lnB>
+                    <a:lnTlToBr>
+                      <a:noFill/>
+                    </a:lnTlToBr>
+                    <a:lnBlToTr>
+                      <a:noFill/>
+                    </a:lnBlToTr>
+                    <a:solidFill>
+                      <a:srgbClr val="E7F3F4"/>
+                    </a:solidFill>
+                  </a:tcPr>
+                </a:tc>
+                <a:extLst>
+                  <a:ext uri="{0D108BD9-81ED-4DB2-BD59-A6C34878D82A}">
+                    <a16:rowId xmlns:a16="http://schemas.microsoft.com/office/drawing/2014/main" val="10001"/>
+                  </a:ext>
+                </a:extLst>
+              </a:tr>
+              <a:tr h="1779588">
+                <a:tc>
+                  <a:txBody>
+                    <a:bodyPr/>
+                    <a:lstStyle/>
+                    <a:p>
+                      <a:pPr marL="0" marR="0" lvl="0" indent="0" algn="ctr" defTabSz="914400" rtl="0" eaLnBrk="1" fontAlgn="base" latinLnBrk="0" hangingPunct="1">
+                        <a:lnSpc>
+                          <a:spcPct val="100000"/>
+                        </a:lnSpc>
+                        <a:spcBef>
+                          <a:spcPct val="0"/>
+                        </a:spcBef>
+                        <a:spcAft>
+                          <a:spcPct val="0"/>
+                        </a:spcAft>
+                        <a:buClrTx/>
+                        <a:buSzTx/>
+                        <a:buFontTx/>
+                        <a:buNone/>
+                        <a:tabLst/>
+                      </a:pPr>
+                      <a:r>
+                        <a:rPr kumimoji="0" lang="en-US" sz="2400" b="0" i="0" u="none" strike="noStrike" cap="none" normalizeH="0" baseline="0" dirty="0">
+                          <a:ln>
+                            <a:noFill/>
+                          </a:ln>
+                          <a:solidFill>
+                            <a:srgbClr val="000000"/>
+                          </a:solidFill>
+                          <a:effectLst/>
+                          <a:latin typeface="微软雅黑" pitchFamily="34" charset="-122"/>
+                          <a:ea typeface="微软雅黑" pitchFamily="34" charset="-122"/>
+                        </a:rPr>
+                        <a:t>SQL</a:t>
+                      </a:r>
+                    </a:p>
+                  </a:txBody>
+                  <a:tcPr marT="45714" marB="45714" horzOverflow="overflow">
+                    <a:lnL w="12700" cap="flat" cmpd="sng" algn="ctr">
+                      <a:solidFill>
+                        <a:schemeClr val="tx1"/>
+                      </a:solidFill>
+                      <a:prstDash val="solid"/>
+                      <a:round/>
+                      <a:headEnd type="none" w="med" len="med"/>
+                      <a:tailEnd type="none" w="med" len="med"/>
+                    </a:lnL>
+                    <a:lnR w="12700" cap="flat" cmpd="sng" algn="ctr">
+                      <a:solidFill>
+                        <a:schemeClr val="tx1"/>
+                      </a:solidFill>
+                      <a:prstDash val="solid"/>
+                      <a:round/>
+                      <a:headEnd type="none" w="med" len="med"/>
+                      <a:tailEnd type="none" w="med" len="med"/>
+                    </a:lnR>
+                    <a:lnT w="12700" cap="flat" cmpd="sng" algn="ctr">
+                      <a:solidFill>
+                        <a:schemeClr val="tx1"/>
+                      </a:solidFill>
+                      <a:prstDash val="solid"/>
+                      <a:round/>
+                      <a:headEnd type="none" w="med" len="med"/>
+                      <a:tailEnd type="none" w="med" len="med"/>
+                    </a:lnT>
+                    <a:lnB w="12700" cap="flat" cmpd="sng" algn="ctr">
+                      <a:solidFill>
+                        <a:schemeClr val="tx1"/>
+                      </a:solidFill>
+                      <a:prstDash val="solid"/>
+                      <a:round/>
+                      <a:headEnd type="none" w="med" len="med"/>
+                      <a:tailEnd type="none" w="med" len="med"/>
+                    </a:lnB>
+                    <a:lnTlToBr>
+                      <a:noFill/>
+                    </a:lnTlToBr>
+                    <a:lnBlToTr>
+                      <a:noFill/>
+                    </a:lnBlToTr>
+                    <a:solidFill>
+                      <a:srgbClr val="F3F9FA"/>
+                    </a:solidFill>
+                  </a:tcPr>
+                </a:tc>
+                <a:tc>
+                  <a:txBody>
+                    <a:bodyPr/>
+                    <a:lstStyle/>
+                    <a:p>
+                      <a:pPr marL="0" marR="0" lvl="0" indent="0" algn="l" defTabSz="914400" rtl="0" eaLnBrk="1" fontAlgn="base" latinLnBrk="0" hangingPunct="1">
+                        <a:lnSpc>
+                          <a:spcPct val="100000"/>
+                        </a:lnSpc>
+                        <a:spcBef>
+                          <a:spcPct val="0"/>
+                        </a:spcBef>
+                        <a:spcAft>
+                          <a:spcPct val="0"/>
+                        </a:spcAft>
+                        <a:buClrTx/>
+                        <a:buSzTx/>
+                        <a:buFontTx/>
+                        <a:buNone/>
+                        <a:tabLst/>
+                      </a:pPr>
+                      <a:r>
+                        <a:rPr kumimoji="0" lang="en-US" sz="2800" b="1" i="0" u="none" strike="noStrike" cap="none" normalizeH="0" baseline="0" dirty="0">
+                          <a:ln>
+                            <a:noFill/>
+                          </a:ln>
+                          <a:solidFill>
+                            <a:srgbClr val="FF0000"/>
+                          </a:solidFill>
+                          <a:effectLst/>
+                          <a:latin typeface="微软雅黑" pitchFamily="34" charset="-122"/>
+                          <a:ea typeface="微软雅黑" pitchFamily="34" charset="-122"/>
+                        </a:rPr>
+                        <a:t>update</a:t>
+                      </a:r>
+                      <a:r>
+                        <a:rPr kumimoji="0" lang="en-US" sz="2800" b="0" i="0" u="none" strike="noStrike" cap="none" normalizeH="0" baseline="0" dirty="0">
+                          <a:ln>
+                            <a:noFill/>
+                          </a:ln>
+                          <a:solidFill>
+                            <a:srgbClr val="000000"/>
+                          </a:solidFill>
+                          <a:effectLst/>
+                          <a:latin typeface="微软雅黑" pitchFamily="34" charset="-122"/>
+                          <a:ea typeface="微软雅黑" pitchFamily="34" charset="-122"/>
+                        </a:rPr>
+                        <a:t> </a:t>
+                      </a:r>
+                      <a:r>
+                        <a:rPr kumimoji="0" lang="en-US" sz="2800" b="1" i="1" u="none" strike="noStrike" cap="none" normalizeH="0" baseline="0" dirty="0">
+                          <a:ln>
+                            <a:noFill/>
+                          </a:ln>
+                          <a:solidFill>
+                            <a:srgbClr val="000000"/>
+                          </a:solidFill>
+                          <a:effectLst/>
+                          <a:latin typeface="微软雅黑" pitchFamily="34" charset="-122"/>
+                          <a:ea typeface="微软雅黑" pitchFamily="34" charset="-122"/>
+                        </a:rPr>
+                        <a:t>table</a:t>
+                      </a:r>
+                      <a:r>
+                        <a:rPr kumimoji="0" lang="en-US" sz="2800" b="0" i="0" u="none" strike="noStrike" cap="none" normalizeH="0" baseline="0" dirty="0">
+                          <a:ln>
+                            <a:noFill/>
+                          </a:ln>
+                          <a:solidFill>
+                            <a:srgbClr val="000000"/>
+                          </a:solidFill>
+                          <a:effectLst/>
+                          <a:latin typeface="微软雅黑" pitchFamily="34" charset="-122"/>
+                          <a:ea typeface="微软雅黑" pitchFamily="34" charset="-122"/>
+                        </a:rPr>
+                        <a:t> </a:t>
+                      </a:r>
+                    </a:p>
+                    <a:p>
+                      <a:pPr marL="0" marR="0" lvl="0" indent="0" algn="l" defTabSz="914400" rtl="0" eaLnBrk="1" fontAlgn="base" latinLnBrk="0" hangingPunct="1">
+                        <a:lnSpc>
+                          <a:spcPct val="100000"/>
+                        </a:lnSpc>
+                        <a:spcBef>
+                          <a:spcPct val="0"/>
+                        </a:spcBef>
+                        <a:spcAft>
+                          <a:spcPct val="0"/>
+                        </a:spcAft>
+                        <a:buClrTx/>
+                        <a:buSzTx/>
+                        <a:buFontTx/>
+                        <a:buNone/>
+                        <a:tabLst/>
+                      </a:pPr>
+                      <a:r>
+                        <a:rPr kumimoji="0" lang="en-US" sz="2800" b="0" i="0" u="none" strike="noStrike" cap="none" normalizeH="0" baseline="0" dirty="0">
+                          <a:ln>
+                            <a:noFill/>
+                          </a:ln>
+                          <a:solidFill>
+                            <a:srgbClr val="000000"/>
+                          </a:solidFill>
+                          <a:effectLst/>
+                          <a:latin typeface="微软雅黑" pitchFamily="34" charset="-122"/>
+                          <a:ea typeface="微软雅黑" pitchFamily="34" charset="-122"/>
+                        </a:rPr>
+                        <a:t>SET age = 21</a:t>
+                      </a:r>
+                    </a:p>
+                    <a:p>
+                      <a:pPr marL="0" marR="0" lvl="0" indent="0" algn="l" defTabSz="914400" rtl="0" eaLnBrk="1" fontAlgn="base" latinLnBrk="0" hangingPunct="1">
+                        <a:lnSpc>
+                          <a:spcPct val="100000"/>
+                        </a:lnSpc>
+                        <a:spcBef>
+                          <a:spcPct val="0"/>
+                        </a:spcBef>
+                        <a:spcAft>
+                          <a:spcPct val="0"/>
+                        </a:spcAft>
+                        <a:buClrTx/>
+                        <a:buSzTx/>
+                        <a:buFontTx/>
+                        <a:buNone/>
+                        <a:tabLst/>
+                      </a:pPr>
+                      <a:r>
+                        <a:rPr kumimoji="0" lang="en-US" sz="2800" b="0" i="0" u="none" strike="noStrike" cap="none" normalizeH="0" baseline="0" dirty="0">
+                          <a:ln>
+                            <a:noFill/>
+                          </a:ln>
+                          <a:solidFill>
+                            <a:srgbClr val="000000"/>
+                          </a:solidFill>
+                          <a:effectLst/>
+                          <a:latin typeface="微软雅黑" pitchFamily="34" charset="-122"/>
+                          <a:ea typeface="微软雅黑" pitchFamily="34" charset="-122"/>
+                        </a:rPr>
+                        <a:t>WHERE name=“Frye”</a:t>
+                      </a:r>
+                    </a:p>
+                  </a:txBody>
+                  <a:tcPr marT="45714" marB="45714" horzOverflow="overflow">
+                    <a:lnL w="12700" cap="flat" cmpd="sng" algn="ctr">
+                      <a:solidFill>
+                        <a:schemeClr val="tx1"/>
+                      </a:solidFill>
+                      <a:prstDash val="solid"/>
+                      <a:round/>
+                      <a:headEnd type="none" w="med" len="med"/>
+                      <a:tailEnd type="none" w="med" len="med"/>
+                    </a:lnL>
+                    <a:lnR w="12700" cap="flat" cmpd="sng" algn="ctr">
+                      <a:solidFill>
+                        <a:schemeClr val="tx1"/>
+                      </a:solidFill>
+                      <a:prstDash val="solid"/>
+                      <a:round/>
+                      <a:headEnd type="none" w="med" len="med"/>
+                      <a:tailEnd type="none" w="med" len="med"/>
+                    </a:lnR>
+                    <a:lnT w="12700" cap="flat" cmpd="sng" algn="ctr">
+                      <a:solidFill>
+                        <a:schemeClr val="tx1"/>
+                      </a:solidFill>
+                      <a:prstDash val="solid"/>
+                      <a:round/>
+                      <a:headEnd type="none" w="med" len="med"/>
+                      <a:tailEnd type="none" w="med" len="med"/>
+                    </a:lnT>
+                    <a:lnB w="12700" cap="flat" cmpd="sng" algn="ctr">
+                      <a:solidFill>
+                        <a:schemeClr val="tx1"/>
+                      </a:solidFill>
+                      <a:prstDash val="solid"/>
+                      <a:round/>
+                      <a:headEnd type="none" w="med" len="med"/>
+                      <a:tailEnd type="none" w="med" len="med"/>
+                    </a:lnB>
+                    <a:lnTlToBr>
+                      <a:noFill/>
+                    </a:lnTlToBr>
+                    <a:lnBlToTr>
+                      <a:noFill/>
+                    </a:lnBlToTr>
+                    <a:solidFill>
+                      <a:srgbClr val="F3F9FA"/>
+                    </a:solidFill>
+                  </a:tcPr>
+                </a:tc>
+                <a:extLst>
+                  <a:ext uri="{0D108BD9-81ED-4DB2-BD59-A6C34878D82A}">
+                    <a16:rowId xmlns:a16="http://schemas.microsoft.com/office/drawing/2014/main" val="10002"/>
+                  </a:ext>
+                </a:extLst>
+              </a:tr>
+            </a:tbl>
+          </a:graphicData>
+        </a:graphic>
+      </p:graphicFrame>
+      <p:cxnSp>
+        <p:nvCxnSpPr>
+          <p:cNvPr id="8" name="Straight Connector 7"/>
+          <p:cNvCxnSpPr/>
+          <p:nvPr/>
+        </p:nvCxnSpPr>
+        <p:spPr>
+          <a:xfrm>
+            <a:off x="2286000" y="3505200"/>
+            <a:ext cx="2819400" cy="0"/>
+          </a:xfrm>
+          <a:prstGeom prst="line">
+            <a:avLst/>
+          </a:prstGeom>
+        </p:spPr>
+        <p:style>
+          <a:lnRef idx="3">
+            <a:schemeClr val="accent2"/>
+          </a:lnRef>
+          <a:fillRef idx="0">
+            <a:schemeClr val="accent2"/>
+          </a:fillRef>
+          <a:effectRef idx="2">
+            <a:schemeClr val="accent2"/>
+          </a:effectRef>
+          <a:fontRef idx="minor">
+            <a:schemeClr val="tx1"/>
+          </a:fontRef>
+        </p:style>
+      </p:cxnSp>
+      <p:cxnSp>
+        <p:nvCxnSpPr>
+          <p:cNvPr id="9" name="Straight Connector 8"/>
+          <p:cNvCxnSpPr/>
+          <p:nvPr/>
+        </p:nvCxnSpPr>
+        <p:spPr>
+          <a:xfrm>
+            <a:off x="1828800" y="6629400"/>
+            <a:ext cx="4038600" cy="0"/>
+          </a:xfrm>
+          <a:prstGeom prst="line">
+            <a:avLst/>
+          </a:prstGeom>
+        </p:spPr>
+        <p:style>
+          <a:lnRef idx="3">
+            <a:schemeClr val="accent2"/>
+          </a:lnRef>
+          <a:fillRef idx="0">
+            <a:schemeClr val="accent2"/>
+          </a:fillRef>
+          <a:effectRef idx="2">
+            <a:schemeClr val="accent2"/>
+          </a:effectRef>
+          <a:fontRef idx="minor">
+            <a:schemeClr val="tx1"/>
+          </a:fontRef>
+        </p:style>
+      </p:cxnSp>
+      <p:cxnSp>
+        <p:nvCxnSpPr>
+          <p:cNvPr id="10" name="Straight Connector 9"/>
+          <p:cNvCxnSpPr/>
+          <p:nvPr/>
+        </p:nvCxnSpPr>
+        <p:spPr>
+          <a:xfrm>
+            <a:off x="2286000" y="3962400"/>
+            <a:ext cx="2819400" cy="0"/>
+          </a:xfrm>
+          <a:prstGeom prst="line">
+            <a:avLst/>
+          </a:prstGeom>
+        </p:spPr>
+        <p:style>
+          <a:lnRef idx="3">
+            <a:schemeClr val="accent2"/>
+          </a:lnRef>
+          <a:fillRef idx="0">
+            <a:schemeClr val="accent2"/>
+          </a:fillRef>
+          <a:effectRef idx="2">
+            <a:schemeClr val="accent2"/>
+          </a:effectRef>
+          <a:fontRef idx="minor">
+            <a:schemeClr val="tx1"/>
+          </a:fontRef>
+        </p:style>
+      </p:cxnSp>
+      <p:cxnSp>
+        <p:nvCxnSpPr>
+          <p:cNvPr id="11" name="Straight Connector 10"/>
+          <p:cNvCxnSpPr/>
+          <p:nvPr/>
+        </p:nvCxnSpPr>
+        <p:spPr>
+          <a:xfrm>
+            <a:off x="1828800" y="6172200"/>
+            <a:ext cx="2819400" cy="0"/>
+          </a:xfrm>
+          <a:prstGeom prst="line">
+            <a:avLst/>
+          </a:prstGeom>
+        </p:spPr>
+        <p:style>
+          <a:lnRef idx="3">
+            <a:schemeClr val="accent2"/>
+          </a:lnRef>
+          <a:fillRef idx="0">
+            <a:schemeClr val="accent2"/>
+          </a:fillRef>
+          <a:effectRef idx="2">
+            <a:schemeClr val="accent2"/>
+          </a:effectRef>
+          <a:fontRef idx="minor">
+            <a:schemeClr val="tx1"/>
+          </a:fontRef>
+        </p:style>
+      </p:cxnSp>
     </p:spTree>
+    <p:extLst>
+      <p:ext uri="{BB962C8B-B14F-4D97-AF65-F5344CB8AC3E}">
+        <p14:creationId xmlns:p14="http://schemas.microsoft.com/office/powerpoint/2010/main" val="3645789402"/>
+      </p:ext>
+    </p:extLst>
   </p:cSld>
   <p:clrMapOvr>
     <a:masterClrMapping/>
   </p:clrMapOvr>
+  <p:timing>
+    <p:tnLst>
+      <p:par>
+        <p:cTn id="1" dur="indefinite" restart="never" nodeType="tmRoot">
+          <p:childTnLst>
+            <p:seq concurrent="1" nextAc="seek">
+              <p:cTn id="2" dur="indefinite" nodeType="mainSeq">
+                <p:childTnLst>
+                  <p:par>
+                    <p:cTn id="3" fill="hold">
+                      <p:stCondLst>
+                        <p:cond delay="indefinite"/>
+                      </p:stCondLst>
+                      <p:childTnLst>
+                        <p:par>
+                          <p:cTn id="4" fill="hold">
+                            <p:stCondLst>
+                              <p:cond delay="0"/>
+                            </p:stCondLst>
+                            <p:childTnLst>
+                              <p:par>
+                                <p:cTn id="5" presetID="10" presetClass="entr" presetSubtype="0" fill="hold" nodeType="clickEffect">
+                                  <p:stCondLst>
+                                    <p:cond delay="0"/>
+                                  </p:stCondLst>
+                                  <p:childTnLst>
+                                    <p:set>
+                                      <p:cBhvr>
+                                        <p:cTn id="6" dur="1" fill="hold">
+                                          <p:stCondLst>
+                                            <p:cond delay="0"/>
+                                          </p:stCondLst>
+                                        </p:cTn>
+                                        <p:tgtEl>
+                                          <p:spTgt spid="9"/>
+                                        </p:tgtEl>
+                                        <p:attrNameLst>
+                                          <p:attrName>style.visibility</p:attrName>
+                                        </p:attrNameLst>
+                                      </p:cBhvr>
+                                      <p:to>
+                                        <p:strVal val="visible"/>
+                                      </p:to>
+                                    </p:set>
+                                    <p:animEffect transition="in" filter="fade">
+                                      <p:cBhvr>
+                                        <p:cTn id="7" dur="500"/>
+                                        <p:tgtEl>
+                                          <p:spTgt spid="9"/>
+                                        </p:tgtEl>
+                                      </p:cBhvr>
+                                    </p:animEffect>
+                                  </p:childTnLst>
+                                </p:cTn>
+                              </p:par>
+                              <p:par>
+                                <p:cTn id="8" presetID="10" presetClass="entr" presetSubtype="0" fill="hold" nodeType="withEffect">
+                                  <p:stCondLst>
+                                    <p:cond delay="0"/>
+                                  </p:stCondLst>
+                                  <p:childTnLst>
+                                    <p:set>
+                                      <p:cBhvr>
+                                        <p:cTn id="9" dur="1" fill="hold">
+                                          <p:stCondLst>
+                                            <p:cond delay="0"/>
+                                          </p:stCondLst>
+                                        </p:cTn>
+                                        <p:tgtEl>
+                                          <p:spTgt spid="8"/>
+                                        </p:tgtEl>
+                                        <p:attrNameLst>
+                                          <p:attrName>style.visibility</p:attrName>
+                                        </p:attrNameLst>
+                                      </p:cBhvr>
+                                      <p:to>
+                                        <p:strVal val="visible"/>
+                                      </p:to>
+                                    </p:set>
+                                    <p:animEffect transition="in" filter="fade">
+                                      <p:cBhvr>
+                                        <p:cTn id="10" dur="500"/>
+                                        <p:tgtEl>
+                                          <p:spTgt spid="8"/>
+                                        </p:tgtEl>
+                                      </p:cBhvr>
+                                    </p:animEffect>
+                                  </p:childTnLst>
+                                </p:cTn>
+                              </p:par>
+                            </p:childTnLst>
+                          </p:cTn>
+                        </p:par>
+                      </p:childTnLst>
+                    </p:cTn>
+                  </p:par>
+                  <p:par>
+                    <p:cTn id="11" fill="hold">
+                      <p:stCondLst>
+                        <p:cond delay="indefinite"/>
+                      </p:stCondLst>
+                      <p:childTnLst>
+                        <p:par>
+                          <p:cTn id="12" fill="hold">
+                            <p:stCondLst>
+                              <p:cond delay="0"/>
+                            </p:stCondLst>
+                            <p:childTnLst>
+                              <p:par>
+                                <p:cTn id="13" presetID="10" presetClass="entr" presetSubtype="0" fill="hold" nodeType="clickEffect">
+                                  <p:stCondLst>
+                                    <p:cond delay="0"/>
+                                  </p:stCondLst>
+                                  <p:childTnLst>
+                                    <p:set>
+                                      <p:cBhvr>
+                                        <p:cTn id="14" dur="1" fill="hold">
+                                          <p:stCondLst>
+                                            <p:cond delay="0"/>
+                                          </p:stCondLst>
+                                        </p:cTn>
+                                        <p:tgtEl>
+                                          <p:spTgt spid="10"/>
+                                        </p:tgtEl>
+                                        <p:attrNameLst>
+                                          <p:attrName>style.visibility</p:attrName>
+                                        </p:attrNameLst>
+                                      </p:cBhvr>
+                                      <p:to>
+                                        <p:strVal val="visible"/>
+                                      </p:to>
+                                    </p:set>
+                                    <p:animEffect transition="in" filter="fade">
+                                      <p:cBhvr>
+                                        <p:cTn id="15" dur="500"/>
+                                        <p:tgtEl>
+                                          <p:spTgt spid="10"/>
+                                        </p:tgtEl>
+                                      </p:cBhvr>
+                                    </p:animEffect>
+                                  </p:childTnLst>
+                                </p:cTn>
+                              </p:par>
+                              <p:par>
+                                <p:cTn id="16" presetID="10" presetClass="entr" presetSubtype="0" fill="hold" nodeType="withEffect">
+                                  <p:stCondLst>
+                                    <p:cond delay="0"/>
+                                  </p:stCondLst>
+                                  <p:childTnLst>
+                                    <p:set>
+                                      <p:cBhvr>
+                                        <p:cTn id="17" dur="1" fill="hold">
+                                          <p:stCondLst>
+                                            <p:cond delay="0"/>
+                                          </p:stCondLst>
+                                        </p:cTn>
+                                        <p:tgtEl>
+                                          <p:spTgt spid="11"/>
+                                        </p:tgtEl>
+                                        <p:attrNameLst>
+                                          <p:attrName>style.visibility</p:attrName>
+                                        </p:attrNameLst>
+                                      </p:cBhvr>
+                                      <p:to>
+                                        <p:strVal val="visible"/>
+                                      </p:to>
+                                    </p:set>
+                                    <p:animEffect transition="in" filter="fade">
+                                      <p:cBhvr>
+                                        <p:cTn id="18" dur="500"/>
+                                        <p:tgtEl>
+                                          <p:spTgt spid="11"/>
+                                        </p:tgtEl>
+                                      </p:cBhvr>
+                                    </p:animEffect>
+                                  </p:childTnLst>
+                                </p:cTn>
+                              </p:par>
+                            </p:childTnLst>
+                          </p:cTn>
+                        </p:par>
+                      </p:childTnLst>
+                    </p:cTn>
+                  </p:par>
+                </p:childTnLst>
+              </p:cTn>
+              <p:prevCondLst>
+                <p:cond evt="onPrev" delay="0">
+                  <p:tgtEl>
+                    <p:sldTgt/>
+                  </p:tgtEl>
+                </p:cond>
+              </p:prevCondLst>
+              <p:nextCondLst>
+                <p:cond evt="onNext" delay="0">
+                  <p:tgtEl>
+                    <p:sldTgt/>
+                  </p:tgtEl>
+                </p:cond>
+              </p:nextCondLst>
+            </p:seq>
+          </p:childTnLst>
+        </p:cTn>
+      </p:par>
+    </p:tnLst>
+  </p:timing>
 </p:sld>
 </file>
 
@@ -10442,7 +11939,1216 @@
           <a:chExt cx="0" cy="0"/>
         </a:xfrm>
       </p:grpSpPr>
+      <p:sp>
+        <p:nvSpPr>
+          <p:cNvPr id="2" name="Text Placeholder 1"/>
+          <p:cNvSpPr>
+            <a:spLocks noGrp="1"/>
+          </p:cNvSpPr>
+          <p:nvPr>
+            <p:ph type="body" sz="quarter" idx="13"/>
+          </p:nvPr>
+        </p:nvSpPr>
+        <p:spPr/>
+        <p:txBody>
+          <a:bodyPr/>
+          <a:lstStyle/>
+          <a:p>
+            <a:r>
+              <a:rPr lang="en-US" dirty="0"/>
+              <a:t>3</a:t>
+            </a:r>
+          </a:p>
+        </p:txBody>
+      </p:sp>
+      <p:sp>
+        <p:nvSpPr>
+          <p:cNvPr id="3" name="Text Placeholder 2"/>
+          <p:cNvSpPr>
+            <a:spLocks noGrp="1"/>
+          </p:cNvSpPr>
+          <p:nvPr>
+            <p:ph type="body" sz="quarter" idx="14"/>
+          </p:nvPr>
+        </p:nvSpPr>
+        <p:spPr/>
+        <p:txBody>
+          <a:bodyPr/>
+          <a:lstStyle/>
+          <a:p>
+            <a:r>
+              <a:rPr lang="en-US" altLang="zh-CN" dirty="0"/>
+              <a:t>Update</a:t>
+            </a:r>
+          </a:p>
+          <a:p>
+            <a:endParaRPr lang="en-US" dirty="0"/>
+          </a:p>
+          <a:p>
+            <a:endParaRPr lang="en-US" dirty="0"/>
+          </a:p>
+        </p:txBody>
+      </p:sp>
+      <p:sp>
+        <p:nvSpPr>
+          <p:cNvPr id="7" name="TextBox 2"/>
+          <p:cNvSpPr txBox="1">
+            <a:spLocks noChangeArrowheads="1"/>
+          </p:cNvSpPr>
+          <p:nvPr/>
+        </p:nvSpPr>
+        <p:spPr bwMode="auto">
+          <a:xfrm>
+            <a:off x="197643" y="1066800"/>
+            <a:ext cx="8824913" cy="954107"/>
+          </a:xfrm>
+          <a:prstGeom prst="rect">
+            <a:avLst/>
+          </a:prstGeom>
+          <a:noFill/>
+          <a:ln w="9525">
+            <a:noFill/>
+            <a:miter lim="800000"/>
+            <a:headEnd/>
+            <a:tailEnd/>
+          </a:ln>
+        </p:spPr>
+        <p:txBody>
+          <a:bodyPr>
+            <a:spAutoFit/>
+          </a:bodyPr>
+          <a:lstStyle>
+            <a:lvl1pPr eaLnBrk="0" hangingPunct="0">
+              <a:defRPr>
+                <a:solidFill>
+                  <a:schemeClr val="tx1"/>
+                </a:solidFill>
+                <a:latin typeface="Arial" charset="0"/>
+                <a:ea typeface="宋体" pitchFamily="2" charset="-122"/>
+              </a:defRPr>
+            </a:lvl1pPr>
+            <a:lvl2pPr marL="742950" indent="-285750" eaLnBrk="0" hangingPunct="0">
+              <a:defRPr>
+                <a:solidFill>
+                  <a:schemeClr val="tx1"/>
+                </a:solidFill>
+                <a:latin typeface="Arial" charset="0"/>
+                <a:ea typeface="宋体" pitchFamily="2" charset="-122"/>
+              </a:defRPr>
+            </a:lvl2pPr>
+            <a:lvl3pPr marL="1143000" indent="-228600" eaLnBrk="0" hangingPunct="0">
+              <a:defRPr>
+                <a:solidFill>
+                  <a:schemeClr val="tx1"/>
+                </a:solidFill>
+                <a:latin typeface="Arial" charset="0"/>
+                <a:ea typeface="宋体" pitchFamily="2" charset="-122"/>
+              </a:defRPr>
+            </a:lvl3pPr>
+            <a:lvl4pPr marL="1600200" indent="-228600" eaLnBrk="0" hangingPunct="0">
+              <a:defRPr>
+                <a:solidFill>
+                  <a:schemeClr val="tx1"/>
+                </a:solidFill>
+                <a:latin typeface="Arial" charset="0"/>
+                <a:ea typeface="宋体" pitchFamily="2" charset="-122"/>
+              </a:defRPr>
+            </a:lvl4pPr>
+            <a:lvl5pPr marL="2057400" indent="-228600" eaLnBrk="0" hangingPunct="0">
+              <a:defRPr>
+                <a:solidFill>
+                  <a:schemeClr val="tx1"/>
+                </a:solidFill>
+                <a:latin typeface="Arial" charset="0"/>
+                <a:ea typeface="宋体" pitchFamily="2" charset="-122"/>
+              </a:defRPr>
+            </a:lvl5pPr>
+            <a:lvl6pPr marL="2514600" indent="-228600" eaLnBrk="0" fontAlgn="base" hangingPunct="0">
+              <a:spcBef>
+                <a:spcPct val="0"/>
+              </a:spcBef>
+              <a:spcAft>
+                <a:spcPct val="0"/>
+              </a:spcAft>
+              <a:defRPr>
+                <a:solidFill>
+                  <a:schemeClr val="tx1"/>
+                </a:solidFill>
+                <a:latin typeface="Arial" charset="0"/>
+                <a:ea typeface="宋体" pitchFamily="2" charset="-122"/>
+              </a:defRPr>
+            </a:lvl6pPr>
+            <a:lvl7pPr marL="2971800" indent="-228600" eaLnBrk="0" fontAlgn="base" hangingPunct="0">
+              <a:spcBef>
+                <a:spcPct val="0"/>
+              </a:spcBef>
+              <a:spcAft>
+                <a:spcPct val="0"/>
+              </a:spcAft>
+              <a:defRPr>
+                <a:solidFill>
+                  <a:schemeClr val="tx1"/>
+                </a:solidFill>
+                <a:latin typeface="Arial" charset="0"/>
+                <a:ea typeface="宋体" pitchFamily="2" charset="-122"/>
+              </a:defRPr>
+            </a:lvl7pPr>
+            <a:lvl8pPr marL="3429000" indent="-228600" eaLnBrk="0" fontAlgn="base" hangingPunct="0">
+              <a:spcBef>
+                <a:spcPct val="0"/>
+              </a:spcBef>
+              <a:spcAft>
+                <a:spcPct val="0"/>
+              </a:spcAft>
+              <a:defRPr>
+                <a:solidFill>
+                  <a:schemeClr val="tx1"/>
+                </a:solidFill>
+                <a:latin typeface="Arial" charset="0"/>
+                <a:ea typeface="宋体" pitchFamily="2" charset="-122"/>
+              </a:defRPr>
+            </a:lvl8pPr>
+            <a:lvl9pPr marL="3886200" indent="-228600" eaLnBrk="0" fontAlgn="base" hangingPunct="0">
+              <a:spcBef>
+                <a:spcPct val="0"/>
+              </a:spcBef>
+              <a:spcAft>
+                <a:spcPct val="0"/>
+              </a:spcAft>
+              <a:defRPr>
+                <a:solidFill>
+                  <a:schemeClr val="tx1"/>
+                </a:solidFill>
+                <a:latin typeface="Arial" charset="0"/>
+                <a:ea typeface="宋体" pitchFamily="2" charset="-122"/>
+              </a:defRPr>
+            </a:lvl9pPr>
+          </a:lstStyle>
+          <a:p>
+            <a:pPr eaLnBrk="1" hangingPunct="1"/>
+            <a:r>
+              <a:rPr lang="en-US" altLang="zh-CN" sz="2800" dirty="0">
+                <a:latin typeface="微软雅黑" panose="020B0503020204020204" pitchFamily="34" charset="-122"/>
+                <a:ea typeface="微软雅黑" panose="020B0503020204020204" pitchFamily="34" charset="-122"/>
+              </a:rPr>
+              <a:t>4 commands for Update document:</a:t>
+            </a:r>
+          </a:p>
+          <a:p>
+            <a:pPr eaLnBrk="1" hangingPunct="1"/>
+            <a:endParaRPr lang="en-US" altLang="zh-CN" sz="2800" dirty="0">
+              <a:solidFill>
+                <a:schemeClr val="bg1"/>
+              </a:solidFill>
+              <a:latin typeface="微软雅黑" pitchFamily="34" charset="-122"/>
+              <a:ea typeface="微软雅黑" pitchFamily="34" charset="-122"/>
+            </a:endParaRPr>
+          </a:p>
+        </p:txBody>
+      </p:sp>
+      <p:sp>
+        <p:nvSpPr>
+          <p:cNvPr id="21" name="Text Placeholder 2"/>
+          <p:cNvSpPr txBox="1">
+            <a:spLocks/>
+          </p:cNvSpPr>
+          <p:nvPr/>
+        </p:nvSpPr>
+        <p:spPr>
+          <a:xfrm>
+            <a:off x="304800" y="1752600"/>
+            <a:ext cx="533400" cy="598714"/>
+          </a:xfrm>
+          <a:prstGeom prst="roundRect">
+            <a:avLst>
+              <a:gd name="adj" fmla="val 0"/>
+            </a:avLst>
+          </a:prstGeom>
+          <a:solidFill>
+            <a:schemeClr val="accent2"/>
+          </a:solidFill>
+          <a:ln>
+            <a:noFill/>
+          </a:ln>
+        </p:spPr>
+        <p:style>
+          <a:lnRef idx="0">
+            <a:scrgbClr r="0" g="0" b="0"/>
+          </a:lnRef>
+          <a:fillRef idx="0">
+            <a:scrgbClr r="0" g="0" b="0"/>
+          </a:fillRef>
+          <a:effectRef idx="0">
+            <a:scrgbClr r="0" g="0" b="0"/>
+          </a:effectRef>
+          <a:fontRef idx="minor">
+            <a:schemeClr val="lt1"/>
+          </a:fontRef>
+        </p:style>
+        <p:txBody>
+          <a:bodyPr/>
+          <a:lstStyle>
+            <a:lvl1pPr marL="342900" indent="-342900" algn="l" defTabSz="914400" rtl="0" eaLnBrk="1" latinLnBrk="0" hangingPunct="1">
+              <a:spcBef>
+                <a:spcPct val="20000"/>
+              </a:spcBef>
+              <a:buFont typeface="Arial" pitchFamily="34" charset="0"/>
+              <a:buChar char="•"/>
+              <a:defRPr sz="3200" kern="1200">
+                <a:solidFill>
+                  <a:schemeClr val="tx1"/>
+                </a:solidFill>
+                <a:latin typeface="+mn-lt"/>
+                <a:ea typeface="+mn-ea"/>
+                <a:cs typeface="+mn-cs"/>
+              </a:defRPr>
+            </a:lvl1pPr>
+            <a:lvl2pPr marL="742950" indent="-285750" algn="l" defTabSz="914400" rtl="0" eaLnBrk="1" latinLnBrk="0" hangingPunct="1">
+              <a:spcBef>
+                <a:spcPct val="20000"/>
+              </a:spcBef>
+              <a:buFont typeface="Arial" pitchFamily="34" charset="0"/>
+              <a:buChar char="–"/>
+              <a:defRPr sz="2800" kern="1200">
+                <a:solidFill>
+                  <a:schemeClr val="tx1"/>
+                </a:solidFill>
+                <a:latin typeface="+mn-lt"/>
+                <a:ea typeface="+mn-ea"/>
+                <a:cs typeface="+mn-cs"/>
+              </a:defRPr>
+            </a:lvl2pPr>
+            <a:lvl3pPr marL="1143000" indent="-228600" algn="l" defTabSz="914400" rtl="0" eaLnBrk="1" latinLnBrk="0" hangingPunct="1">
+              <a:spcBef>
+                <a:spcPct val="20000"/>
+              </a:spcBef>
+              <a:buFont typeface="Arial" pitchFamily="34" charset="0"/>
+              <a:buChar char="•"/>
+              <a:defRPr sz="2400" kern="1200">
+                <a:solidFill>
+                  <a:schemeClr val="tx1"/>
+                </a:solidFill>
+                <a:latin typeface="+mn-lt"/>
+                <a:ea typeface="+mn-ea"/>
+                <a:cs typeface="+mn-cs"/>
+              </a:defRPr>
+            </a:lvl3pPr>
+            <a:lvl4pPr marL="1600200" indent="-228600" algn="l" defTabSz="914400" rtl="0" eaLnBrk="1" latinLnBrk="0" hangingPunct="1">
+              <a:spcBef>
+                <a:spcPct val="20000"/>
+              </a:spcBef>
+              <a:buFont typeface="Arial" pitchFamily="34" charset="0"/>
+              <a:buChar char="–"/>
+              <a:defRPr sz="2000" kern="1200">
+                <a:solidFill>
+                  <a:schemeClr val="tx1"/>
+                </a:solidFill>
+                <a:latin typeface="+mn-lt"/>
+                <a:ea typeface="+mn-ea"/>
+                <a:cs typeface="+mn-cs"/>
+              </a:defRPr>
+            </a:lvl4pPr>
+            <a:lvl5pPr marL="2057400" indent="-228600" algn="l" defTabSz="914400" rtl="0" eaLnBrk="1" latinLnBrk="0" hangingPunct="1">
+              <a:spcBef>
+                <a:spcPct val="20000"/>
+              </a:spcBef>
+              <a:buFont typeface="Arial" pitchFamily="34" charset="0"/>
+              <a:buChar char="»"/>
+              <a:defRPr sz="2000" kern="1200">
+                <a:solidFill>
+                  <a:schemeClr val="tx1"/>
+                </a:solidFill>
+                <a:latin typeface="+mn-lt"/>
+                <a:ea typeface="+mn-ea"/>
+                <a:cs typeface="+mn-cs"/>
+              </a:defRPr>
+            </a:lvl5pPr>
+            <a:lvl6pPr marL="2514600" indent="-228600" algn="l" defTabSz="914400" rtl="0" eaLnBrk="1" latinLnBrk="0" hangingPunct="1">
+              <a:spcBef>
+                <a:spcPct val="20000"/>
+              </a:spcBef>
+              <a:buFont typeface="Arial" pitchFamily="34" charset="0"/>
+              <a:buChar char="•"/>
+              <a:defRPr sz="2000" kern="1200">
+                <a:solidFill>
+                  <a:schemeClr val="tx1"/>
+                </a:solidFill>
+                <a:latin typeface="+mn-lt"/>
+                <a:ea typeface="+mn-ea"/>
+                <a:cs typeface="+mn-cs"/>
+              </a:defRPr>
+            </a:lvl6pPr>
+            <a:lvl7pPr marL="2971800" indent="-228600" algn="l" defTabSz="914400" rtl="0" eaLnBrk="1" latinLnBrk="0" hangingPunct="1">
+              <a:spcBef>
+                <a:spcPct val="20000"/>
+              </a:spcBef>
+              <a:buFont typeface="Arial" pitchFamily="34" charset="0"/>
+              <a:buChar char="•"/>
+              <a:defRPr sz="2000" kern="1200">
+                <a:solidFill>
+                  <a:schemeClr val="tx1"/>
+                </a:solidFill>
+                <a:latin typeface="+mn-lt"/>
+                <a:ea typeface="+mn-ea"/>
+                <a:cs typeface="+mn-cs"/>
+              </a:defRPr>
+            </a:lvl7pPr>
+            <a:lvl8pPr marL="3429000" indent="-228600" algn="l" defTabSz="914400" rtl="0" eaLnBrk="1" latinLnBrk="0" hangingPunct="1">
+              <a:spcBef>
+                <a:spcPct val="20000"/>
+              </a:spcBef>
+              <a:buFont typeface="Arial" pitchFamily="34" charset="0"/>
+              <a:buChar char="•"/>
+              <a:defRPr sz="2000" kern="1200">
+                <a:solidFill>
+                  <a:schemeClr val="tx1"/>
+                </a:solidFill>
+                <a:latin typeface="+mn-lt"/>
+                <a:ea typeface="+mn-ea"/>
+                <a:cs typeface="+mn-cs"/>
+              </a:defRPr>
+            </a:lvl8pPr>
+            <a:lvl9pPr marL="3886200" indent="-228600" algn="l" defTabSz="914400" rtl="0" eaLnBrk="1" latinLnBrk="0" hangingPunct="1">
+              <a:spcBef>
+                <a:spcPct val="20000"/>
+              </a:spcBef>
+              <a:buFont typeface="Arial" pitchFamily="34" charset="0"/>
+              <a:buChar char="•"/>
+              <a:defRPr sz="2000" kern="1200">
+                <a:solidFill>
+                  <a:schemeClr val="tx1"/>
+                </a:solidFill>
+                <a:latin typeface="+mn-lt"/>
+                <a:ea typeface="+mn-ea"/>
+                <a:cs typeface="+mn-cs"/>
+              </a:defRPr>
+            </a:lvl9pPr>
+          </a:lstStyle>
+          <a:p>
+            <a:pPr marL="0" indent="0">
+              <a:buNone/>
+            </a:pPr>
+            <a:r>
+              <a:rPr lang="en-US" dirty="0">
+                <a:solidFill>
+                  <a:schemeClr val="bg1"/>
+                </a:solidFill>
+              </a:rPr>
+              <a:t> </a:t>
+            </a:r>
+            <a:r>
+              <a:rPr lang="en-US" b="1" dirty="0">
+                <a:solidFill>
+                  <a:schemeClr val="bg1"/>
+                </a:solidFill>
+              </a:rPr>
+              <a:t>1</a:t>
+            </a:r>
+          </a:p>
+        </p:txBody>
+      </p:sp>
+      <p:sp>
+        <p:nvSpPr>
+          <p:cNvPr id="22" name="TextBox 21"/>
+          <p:cNvSpPr txBox="1"/>
+          <p:nvPr/>
+        </p:nvSpPr>
+        <p:spPr>
+          <a:xfrm>
+            <a:off x="945357" y="1790347"/>
+            <a:ext cx="4953000" cy="523220"/>
+          </a:xfrm>
+          <a:prstGeom prst="rect">
+            <a:avLst/>
+          </a:prstGeom>
+          <a:noFill/>
+        </p:spPr>
+        <p:txBody>
+          <a:bodyPr wrap="square" rtlCol="0">
+            <a:spAutoFit/>
+          </a:bodyPr>
+          <a:lstStyle/>
+          <a:p>
+            <a:r>
+              <a:rPr lang="en-US" sz="2800" dirty="0" err="1"/>
+              <a:t>db.</a:t>
+            </a:r>
+            <a:r>
+              <a:rPr lang="en-US" sz="2800" i="1" dirty="0" err="1"/>
+              <a:t>collection</a:t>
+            </a:r>
+            <a:r>
+              <a:rPr lang="en-US" sz="2800" dirty="0" err="1"/>
+              <a:t>.</a:t>
+            </a:r>
+            <a:r>
+              <a:rPr lang="en-US" sz="2800" b="1" dirty="0" err="1"/>
+              <a:t>updateOne</a:t>
+            </a:r>
+            <a:r>
+              <a:rPr lang="en-US" sz="2800" dirty="0"/>
+              <a:t>()</a:t>
+            </a:r>
+          </a:p>
+        </p:txBody>
+      </p:sp>
+      <p:sp>
+        <p:nvSpPr>
+          <p:cNvPr id="23" name="Text Placeholder 2"/>
+          <p:cNvSpPr txBox="1">
+            <a:spLocks/>
+          </p:cNvSpPr>
+          <p:nvPr/>
+        </p:nvSpPr>
+        <p:spPr>
+          <a:xfrm>
+            <a:off x="304800" y="2513894"/>
+            <a:ext cx="533400" cy="598714"/>
+          </a:xfrm>
+          <a:prstGeom prst="roundRect">
+            <a:avLst>
+              <a:gd name="adj" fmla="val 0"/>
+            </a:avLst>
+          </a:prstGeom>
+          <a:solidFill>
+            <a:schemeClr val="accent2"/>
+          </a:solidFill>
+          <a:ln>
+            <a:noFill/>
+          </a:ln>
+        </p:spPr>
+        <p:style>
+          <a:lnRef idx="0">
+            <a:scrgbClr r="0" g="0" b="0"/>
+          </a:lnRef>
+          <a:fillRef idx="0">
+            <a:scrgbClr r="0" g="0" b="0"/>
+          </a:fillRef>
+          <a:effectRef idx="0">
+            <a:scrgbClr r="0" g="0" b="0"/>
+          </a:effectRef>
+          <a:fontRef idx="minor">
+            <a:schemeClr val="lt1"/>
+          </a:fontRef>
+        </p:style>
+        <p:txBody>
+          <a:bodyPr/>
+          <a:lstStyle>
+            <a:lvl1pPr marL="342900" indent="-342900" algn="l" defTabSz="914400" rtl="0" eaLnBrk="1" latinLnBrk="0" hangingPunct="1">
+              <a:spcBef>
+                <a:spcPct val="20000"/>
+              </a:spcBef>
+              <a:buFont typeface="Arial" pitchFamily="34" charset="0"/>
+              <a:buChar char="•"/>
+              <a:defRPr sz="3200" kern="1200">
+                <a:solidFill>
+                  <a:schemeClr val="tx1"/>
+                </a:solidFill>
+                <a:latin typeface="+mn-lt"/>
+                <a:ea typeface="+mn-ea"/>
+                <a:cs typeface="+mn-cs"/>
+              </a:defRPr>
+            </a:lvl1pPr>
+            <a:lvl2pPr marL="742950" indent="-285750" algn="l" defTabSz="914400" rtl="0" eaLnBrk="1" latinLnBrk="0" hangingPunct="1">
+              <a:spcBef>
+                <a:spcPct val="20000"/>
+              </a:spcBef>
+              <a:buFont typeface="Arial" pitchFamily="34" charset="0"/>
+              <a:buChar char="–"/>
+              <a:defRPr sz="2800" kern="1200">
+                <a:solidFill>
+                  <a:schemeClr val="tx1"/>
+                </a:solidFill>
+                <a:latin typeface="+mn-lt"/>
+                <a:ea typeface="+mn-ea"/>
+                <a:cs typeface="+mn-cs"/>
+              </a:defRPr>
+            </a:lvl2pPr>
+            <a:lvl3pPr marL="1143000" indent="-228600" algn="l" defTabSz="914400" rtl="0" eaLnBrk="1" latinLnBrk="0" hangingPunct="1">
+              <a:spcBef>
+                <a:spcPct val="20000"/>
+              </a:spcBef>
+              <a:buFont typeface="Arial" pitchFamily="34" charset="0"/>
+              <a:buChar char="•"/>
+              <a:defRPr sz="2400" kern="1200">
+                <a:solidFill>
+                  <a:schemeClr val="tx1"/>
+                </a:solidFill>
+                <a:latin typeface="+mn-lt"/>
+                <a:ea typeface="+mn-ea"/>
+                <a:cs typeface="+mn-cs"/>
+              </a:defRPr>
+            </a:lvl3pPr>
+            <a:lvl4pPr marL="1600200" indent="-228600" algn="l" defTabSz="914400" rtl="0" eaLnBrk="1" latinLnBrk="0" hangingPunct="1">
+              <a:spcBef>
+                <a:spcPct val="20000"/>
+              </a:spcBef>
+              <a:buFont typeface="Arial" pitchFamily="34" charset="0"/>
+              <a:buChar char="–"/>
+              <a:defRPr sz="2000" kern="1200">
+                <a:solidFill>
+                  <a:schemeClr val="tx1"/>
+                </a:solidFill>
+                <a:latin typeface="+mn-lt"/>
+                <a:ea typeface="+mn-ea"/>
+                <a:cs typeface="+mn-cs"/>
+              </a:defRPr>
+            </a:lvl4pPr>
+            <a:lvl5pPr marL="2057400" indent="-228600" algn="l" defTabSz="914400" rtl="0" eaLnBrk="1" latinLnBrk="0" hangingPunct="1">
+              <a:spcBef>
+                <a:spcPct val="20000"/>
+              </a:spcBef>
+              <a:buFont typeface="Arial" pitchFamily="34" charset="0"/>
+              <a:buChar char="»"/>
+              <a:defRPr sz="2000" kern="1200">
+                <a:solidFill>
+                  <a:schemeClr val="tx1"/>
+                </a:solidFill>
+                <a:latin typeface="+mn-lt"/>
+                <a:ea typeface="+mn-ea"/>
+                <a:cs typeface="+mn-cs"/>
+              </a:defRPr>
+            </a:lvl5pPr>
+            <a:lvl6pPr marL="2514600" indent="-228600" algn="l" defTabSz="914400" rtl="0" eaLnBrk="1" latinLnBrk="0" hangingPunct="1">
+              <a:spcBef>
+                <a:spcPct val="20000"/>
+              </a:spcBef>
+              <a:buFont typeface="Arial" pitchFamily="34" charset="0"/>
+              <a:buChar char="•"/>
+              <a:defRPr sz="2000" kern="1200">
+                <a:solidFill>
+                  <a:schemeClr val="tx1"/>
+                </a:solidFill>
+                <a:latin typeface="+mn-lt"/>
+                <a:ea typeface="+mn-ea"/>
+                <a:cs typeface="+mn-cs"/>
+              </a:defRPr>
+            </a:lvl6pPr>
+            <a:lvl7pPr marL="2971800" indent="-228600" algn="l" defTabSz="914400" rtl="0" eaLnBrk="1" latinLnBrk="0" hangingPunct="1">
+              <a:spcBef>
+                <a:spcPct val="20000"/>
+              </a:spcBef>
+              <a:buFont typeface="Arial" pitchFamily="34" charset="0"/>
+              <a:buChar char="•"/>
+              <a:defRPr sz="2000" kern="1200">
+                <a:solidFill>
+                  <a:schemeClr val="tx1"/>
+                </a:solidFill>
+                <a:latin typeface="+mn-lt"/>
+                <a:ea typeface="+mn-ea"/>
+                <a:cs typeface="+mn-cs"/>
+              </a:defRPr>
+            </a:lvl7pPr>
+            <a:lvl8pPr marL="3429000" indent="-228600" algn="l" defTabSz="914400" rtl="0" eaLnBrk="1" latinLnBrk="0" hangingPunct="1">
+              <a:spcBef>
+                <a:spcPct val="20000"/>
+              </a:spcBef>
+              <a:buFont typeface="Arial" pitchFamily="34" charset="0"/>
+              <a:buChar char="•"/>
+              <a:defRPr sz="2000" kern="1200">
+                <a:solidFill>
+                  <a:schemeClr val="tx1"/>
+                </a:solidFill>
+                <a:latin typeface="+mn-lt"/>
+                <a:ea typeface="+mn-ea"/>
+                <a:cs typeface="+mn-cs"/>
+              </a:defRPr>
+            </a:lvl8pPr>
+            <a:lvl9pPr marL="3886200" indent="-228600" algn="l" defTabSz="914400" rtl="0" eaLnBrk="1" latinLnBrk="0" hangingPunct="1">
+              <a:spcBef>
+                <a:spcPct val="20000"/>
+              </a:spcBef>
+              <a:buFont typeface="Arial" pitchFamily="34" charset="0"/>
+              <a:buChar char="•"/>
+              <a:defRPr sz="2000" kern="1200">
+                <a:solidFill>
+                  <a:schemeClr val="tx1"/>
+                </a:solidFill>
+                <a:latin typeface="+mn-lt"/>
+                <a:ea typeface="+mn-ea"/>
+                <a:cs typeface="+mn-cs"/>
+              </a:defRPr>
+            </a:lvl9pPr>
+          </a:lstStyle>
+          <a:p>
+            <a:pPr marL="0" indent="0">
+              <a:buNone/>
+            </a:pPr>
+            <a:r>
+              <a:rPr lang="en-US" dirty="0">
+                <a:solidFill>
+                  <a:schemeClr val="bg1"/>
+                </a:solidFill>
+              </a:rPr>
+              <a:t> </a:t>
+            </a:r>
+            <a:r>
+              <a:rPr lang="en-US" b="1" dirty="0">
+                <a:solidFill>
+                  <a:schemeClr val="bg1"/>
+                </a:solidFill>
+              </a:rPr>
+              <a:t>2</a:t>
+            </a:r>
+          </a:p>
+        </p:txBody>
+      </p:sp>
+      <p:sp>
+        <p:nvSpPr>
+          <p:cNvPr id="24" name="TextBox 23"/>
+          <p:cNvSpPr txBox="1"/>
+          <p:nvPr/>
+        </p:nvSpPr>
+        <p:spPr>
+          <a:xfrm>
+            <a:off x="945357" y="2551641"/>
+            <a:ext cx="4953000" cy="523220"/>
+          </a:xfrm>
+          <a:prstGeom prst="rect">
+            <a:avLst/>
+          </a:prstGeom>
+          <a:noFill/>
+        </p:spPr>
+        <p:txBody>
+          <a:bodyPr wrap="square" rtlCol="0">
+            <a:spAutoFit/>
+          </a:bodyPr>
+          <a:lstStyle/>
+          <a:p>
+            <a:r>
+              <a:rPr lang="en-US" sz="2800" dirty="0" err="1"/>
+              <a:t>db.</a:t>
+            </a:r>
+            <a:r>
+              <a:rPr lang="en-US" sz="2800" i="1" dirty="0" err="1"/>
+              <a:t>collection</a:t>
+            </a:r>
+            <a:r>
+              <a:rPr lang="en-US" sz="2800" dirty="0" err="1"/>
+              <a:t>.</a:t>
+            </a:r>
+            <a:r>
+              <a:rPr lang="en-US" sz="2800" b="1" dirty="0" err="1"/>
+              <a:t>updateMany</a:t>
+            </a:r>
+            <a:r>
+              <a:rPr lang="en-US" sz="2800" dirty="0"/>
+              <a:t>()</a:t>
+            </a:r>
+          </a:p>
+        </p:txBody>
+      </p:sp>
+      <p:sp>
+        <p:nvSpPr>
+          <p:cNvPr id="25" name="Text Placeholder 2"/>
+          <p:cNvSpPr txBox="1">
+            <a:spLocks/>
+          </p:cNvSpPr>
+          <p:nvPr/>
+        </p:nvSpPr>
+        <p:spPr>
+          <a:xfrm>
+            <a:off x="304800" y="3285348"/>
+            <a:ext cx="533400" cy="598714"/>
+          </a:xfrm>
+          <a:prstGeom prst="roundRect">
+            <a:avLst>
+              <a:gd name="adj" fmla="val 0"/>
+            </a:avLst>
+          </a:prstGeom>
+          <a:solidFill>
+            <a:schemeClr val="accent2"/>
+          </a:solidFill>
+          <a:ln>
+            <a:noFill/>
+          </a:ln>
+        </p:spPr>
+        <p:style>
+          <a:lnRef idx="0">
+            <a:scrgbClr r="0" g="0" b="0"/>
+          </a:lnRef>
+          <a:fillRef idx="0">
+            <a:scrgbClr r="0" g="0" b="0"/>
+          </a:fillRef>
+          <a:effectRef idx="0">
+            <a:scrgbClr r="0" g="0" b="0"/>
+          </a:effectRef>
+          <a:fontRef idx="minor">
+            <a:schemeClr val="lt1"/>
+          </a:fontRef>
+        </p:style>
+        <p:txBody>
+          <a:bodyPr/>
+          <a:lstStyle>
+            <a:lvl1pPr marL="342900" indent="-342900" algn="l" defTabSz="914400" rtl="0" eaLnBrk="1" latinLnBrk="0" hangingPunct="1">
+              <a:spcBef>
+                <a:spcPct val="20000"/>
+              </a:spcBef>
+              <a:buFont typeface="Arial" pitchFamily="34" charset="0"/>
+              <a:buChar char="•"/>
+              <a:defRPr sz="3200" kern="1200">
+                <a:solidFill>
+                  <a:schemeClr val="tx1"/>
+                </a:solidFill>
+                <a:latin typeface="+mn-lt"/>
+                <a:ea typeface="+mn-ea"/>
+                <a:cs typeface="+mn-cs"/>
+              </a:defRPr>
+            </a:lvl1pPr>
+            <a:lvl2pPr marL="742950" indent="-285750" algn="l" defTabSz="914400" rtl="0" eaLnBrk="1" latinLnBrk="0" hangingPunct="1">
+              <a:spcBef>
+                <a:spcPct val="20000"/>
+              </a:spcBef>
+              <a:buFont typeface="Arial" pitchFamily="34" charset="0"/>
+              <a:buChar char="–"/>
+              <a:defRPr sz="2800" kern="1200">
+                <a:solidFill>
+                  <a:schemeClr val="tx1"/>
+                </a:solidFill>
+                <a:latin typeface="+mn-lt"/>
+                <a:ea typeface="+mn-ea"/>
+                <a:cs typeface="+mn-cs"/>
+              </a:defRPr>
+            </a:lvl2pPr>
+            <a:lvl3pPr marL="1143000" indent="-228600" algn="l" defTabSz="914400" rtl="0" eaLnBrk="1" latinLnBrk="0" hangingPunct="1">
+              <a:spcBef>
+                <a:spcPct val="20000"/>
+              </a:spcBef>
+              <a:buFont typeface="Arial" pitchFamily="34" charset="0"/>
+              <a:buChar char="•"/>
+              <a:defRPr sz="2400" kern="1200">
+                <a:solidFill>
+                  <a:schemeClr val="tx1"/>
+                </a:solidFill>
+                <a:latin typeface="+mn-lt"/>
+                <a:ea typeface="+mn-ea"/>
+                <a:cs typeface="+mn-cs"/>
+              </a:defRPr>
+            </a:lvl3pPr>
+            <a:lvl4pPr marL="1600200" indent="-228600" algn="l" defTabSz="914400" rtl="0" eaLnBrk="1" latinLnBrk="0" hangingPunct="1">
+              <a:spcBef>
+                <a:spcPct val="20000"/>
+              </a:spcBef>
+              <a:buFont typeface="Arial" pitchFamily="34" charset="0"/>
+              <a:buChar char="–"/>
+              <a:defRPr sz="2000" kern="1200">
+                <a:solidFill>
+                  <a:schemeClr val="tx1"/>
+                </a:solidFill>
+                <a:latin typeface="+mn-lt"/>
+                <a:ea typeface="+mn-ea"/>
+                <a:cs typeface="+mn-cs"/>
+              </a:defRPr>
+            </a:lvl4pPr>
+            <a:lvl5pPr marL="2057400" indent="-228600" algn="l" defTabSz="914400" rtl="0" eaLnBrk="1" latinLnBrk="0" hangingPunct="1">
+              <a:spcBef>
+                <a:spcPct val="20000"/>
+              </a:spcBef>
+              <a:buFont typeface="Arial" pitchFamily="34" charset="0"/>
+              <a:buChar char="»"/>
+              <a:defRPr sz="2000" kern="1200">
+                <a:solidFill>
+                  <a:schemeClr val="tx1"/>
+                </a:solidFill>
+                <a:latin typeface="+mn-lt"/>
+                <a:ea typeface="+mn-ea"/>
+                <a:cs typeface="+mn-cs"/>
+              </a:defRPr>
+            </a:lvl5pPr>
+            <a:lvl6pPr marL="2514600" indent="-228600" algn="l" defTabSz="914400" rtl="0" eaLnBrk="1" latinLnBrk="0" hangingPunct="1">
+              <a:spcBef>
+                <a:spcPct val="20000"/>
+              </a:spcBef>
+              <a:buFont typeface="Arial" pitchFamily="34" charset="0"/>
+              <a:buChar char="•"/>
+              <a:defRPr sz="2000" kern="1200">
+                <a:solidFill>
+                  <a:schemeClr val="tx1"/>
+                </a:solidFill>
+                <a:latin typeface="+mn-lt"/>
+                <a:ea typeface="+mn-ea"/>
+                <a:cs typeface="+mn-cs"/>
+              </a:defRPr>
+            </a:lvl6pPr>
+            <a:lvl7pPr marL="2971800" indent="-228600" algn="l" defTabSz="914400" rtl="0" eaLnBrk="1" latinLnBrk="0" hangingPunct="1">
+              <a:spcBef>
+                <a:spcPct val="20000"/>
+              </a:spcBef>
+              <a:buFont typeface="Arial" pitchFamily="34" charset="0"/>
+              <a:buChar char="•"/>
+              <a:defRPr sz="2000" kern="1200">
+                <a:solidFill>
+                  <a:schemeClr val="tx1"/>
+                </a:solidFill>
+                <a:latin typeface="+mn-lt"/>
+                <a:ea typeface="+mn-ea"/>
+                <a:cs typeface="+mn-cs"/>
+              </a:defRPr>
+            </a:lvl7pPr>
+            <a:lvl8pPr marL="3429000" indent="-228600" algn="l" defTabSz="914400" rtl="0" eaLnBrk="1" latinLnBrk="0" hangingPunct="1">
+              <a:spcBef>
+                <a:spcPct val="20000"/>
+              </a:spcBef>
+              <a:buFont typeface="Arial" pitchFamily="34" charset="0"/>
+              <a:buChar char="•"/>
+              <a:defRPr sz="2000" kern="1200">
+                <a:solidFill>
+                  <a:schemeClr val="tx1"/>
+                </a:solidFill>
+                <a:latin typeface="+mn-lt"/>
+                <a:ea typeface="+mn-ea"/>
+                <a:cs typeface="+mn-cs"/>
+              </a:defRPr>
+            </a:lvl8pPr>
+            <a:lvl9pPr marL="3886200" indent="-228600" algn="l" defTabSz="914400" rtl="0" eaLnBrk="1" latinLnBrk="0" hangingPunct="1">
+              <a:spcBef>
+                <a:spcPct val="20000"/>
+              </a:spcBef>
+              <a:buFont typeface="Arial" pitchFamily="34" charset="0"/>
+              <a:buChar char="•"/>
+              <a:defRPr sz="2000" kern="1200">
+                <a:solidFill>
+                  <a:schemeClr val="tx1"/>
+                </a:solidFill>
+                <a:latin typeface="+mn-lt"/>
+                <a:ea typeface="+mn-ea"/>
+                <a:cs typeface="+mn-cs"/>
+              </a:defRPr>
+            </a:lvl9pPr>
+          </a:lstStyle>
+          <a:p>
+            <a:pPr marL="0" indent="0">
+              <a:buNone/>
+            </a:pPr>
+            <a:r>
+              <a:rPr lang="en-US" dirty="0">
+                <a:solidFill>
+                  <a:schemeClr val="bg1"/>
+                </a:solidFill>
+              </a:rPr>
+              <a:t> </a:t>
+            </a:r>
+            <a:r>
+              <a:rPr lang="en-US" b="1" dirty="0">
+                <a:solidFill>
+                  <a:schemeClr val="bg1"/>
+                </a:solidFill>
+              </a:rPr>
+              <a:t>3</a:t>
+            </a:r>
+          </a:p>
+        </p:txBody>
+      </p:sp>
+      <p:sp>
+        <p:nvSpPr>
+          <p:cNvPr id="26" name="TextBox 25"/>
+          <p:cNvSpPr txBox="1"/>
+          <p:nvPr/>
+        </p:nvSpPr>
+        <p:spPr>
+          <a:xfrm>
+            <a:off x="945356" y="3323095"/>
+            <a:ext cx="7284244" cy="523220"/>
+          </a:xfrm>
+          <a:prstGeom prst="rect">
+            <a:avLst/>
+          </a:prstGeom>
+          <a:noFill/>
+        </p:spPr>
+        <p:txBody>
+          <a:bodyPr wrap="square" rtlCol="0">
+            <a:spAutoFit/>
+          </a:bodyPr>
+          <a:lstStyle/>
+          <a:p>
+            <a:r>
+              <a:rPr lang="en-US" sz="2800" dirty="0" err="1"/>
+              <a:t>db.</a:t>
+            </a:r>
+            <a:r>
+              <a:rPr lang="en-US" sz="2800" i="1" dirty="0" err="1"/>
+              <a:t>collection</a:t>
+            </a:r>
+            <a:r>
+              <a:rPr lang="en-US" sz="2800" dirty="0" err="1"/>
+              <a:t>.</a:t>
+            </a:r>
+            <a:r>
+              <a:rPr lang="en-US" sz="2800" b="1" dirty="0" err="1"/>
+              <a:t>replaceOne</a:t>
+            </a:r>
+            <a:r>
+              <a:rPr lang="en-US" sz="2800"/>
+              <a:t>()</a:t>
+            </a:r>
+            <a:endParaRPr lang="en-US" sz="2800" dirty="0">
+              <a:solidFill>
+                <a:srgbClr val="009444"/>
+              </a:solidFill>
+            </a:endParaRPr>
+          </a:p>
+        </p:txBody>
+      </p:sp>
+      <p:sp>
+        <p:nvSpPr>
+          <p:cNvPr id="11" name="Text Placeholder 2"/>
+          <p:cNvSpPr txBox="1">
+            <a:spLocks/>
+          </p:cNvSpPr>
+          <p:nvPr/>
+        </p:nvSpPr>
+        <p:spPr>
+          <a:xfrm>
+            <a:off x="304800" y="4072353"/>
+            <a:ext cx="533400" cy="598714"/>
+          </a:xfrm>
+          <a:prstGeom prst="roundRect">
+            <a:avLst>
+              <a:gd name="adj" fmla="val 0"/>
+            </a:avLst>
+          </a:prstGeom>
+          <a:solidFill>
+            <a:schemeClr val="accent2"/>
+          </a:solidFill>
+          <a:ln>
+            <a:noFill/>
+          </a:ln>
+        </p:spPr>
+        <p:style>
+          <a:lnRef idx="0">
+            <a:scrgbClr r="0" g="0" b="0"/>
+          </a:lnRef>
+          <a:fillRef idx="0">
+            <a:scrgbClr r="0" g="0" b="0"/>
+          </a:fillRef>
+          <a:effectRef idx="0">
+            <a:scrgbClr r="0" g="0" b="0"/>
+          </a:effectRef>
+          <a:fontRef idx="minor">
+            <a:schemeClr val="lt1"/>
+          </a:fontRef>
+        </p:style>
+        <p:txBody>
+          <a:bodyPr/>
+          <a:lstStyle>
+            <a:lvl1pPr marL="342900" indent="-342900" algn="l" defTabSz="914400" rtl="0" eaLnBrk="1" latinLnBrk="0" hangingPunct="1">
+              <a:spcBef>
+                <a:spcPct val="20000"/>
+              </a:spcBef>
+              <a:buFont typeface="Arial" pitchFamily="34" charset="0"/>
+              <a:buChar char="•"/>
+              <a:defRPr sz="3200" kern="1200">
+                <a:solidFill>
+                  <a:schemeClr val="tx1"/>
+                </a:solidFill>
+                <a:latin typeface="+mn-lt"/>
+                <a:ea typeface="+mn-ea"/>
+                <a:cs typeface="+mn-cs"/>
+              </a:defRPr>
+            </a:lvl1pPr>
+            <a:lvl2pPr marL="742950" indent="-285750" algn="l" defTabSz="914400" rtl="0" eaLnBrk="1" latinLnBrk="0" hangingPunct="1">
+              <a:spcBef>
+                <a:spcPct val="20000"/>
+              </a:spcBef>
+              <a:buFont typeface="Arial" pitchFamily="34" charset="0"/>
+              <a:buChar char="–"/>
+              <a:defRPr sz="2800" kern="1200">
+                <a:solidFill>
+                  <a:schemeClr val="tx1"/>
+                </a:solidFill>
+                <a:latin typeface="+mn-lt"/>
+                <a:ea typeface="+mn-ea"/>
+                <a:cs typeface="+mn-cs"/>
+              </a:defRPr>
+            </a:lvl2pPr>
+            <a:lvl3pPr marL="1143000" indent="-228600" algn="l" defTabSz="914400" rtl="0" eaLnBrk="1" latinLnBrk="0" hangingPunct="1">
+              <a:spcBef>
+                <a:spcPct val="20000"/>
+              </a:spcBef>
+              <a:buFont typeface="Arial" pitchFamily="34" charset="0"/>
+              <a:buChar char="•"/>
+              <a:defRPr sz="2400" kern="1200">
+                <a:solidFill>
+                  <a:schemeClr val="tx1"/>
+                </a:solidFill>
+                <a:latin typeface="+mn-lt"/>
+                <a:ea typeface="+mn-ea"/>
+                <a:cs typeface="+mn-cs"/>
+              </a:defRPr>
+            </a:lvl3pPr>
+            <a:lvl4pPr marL="1600200" indent="-228600" algn="l" defTabSz="914400" rtl="0" eaLnBrk="1" latinLnBrk="0" hangingPunct="1">
+              <a:spcBef>
+                <a:spcPct val="20000"/>
+              </a:spcBef>
+              <a:buFont typeface="Arial" pitchFamily="34" charset="0"/>
+              <a:buChar char="–"/>
+              <a:defRPr sz="2000" kern="1200">
+                <a:solidFill>
+                  <a:schemeClr val="tx1"/>
+                </a:solidFill>
+                <a:latin typeface="+mn-lt"/>
+                <a:ea typeface="+mn-ea"/>
+                <a:cs typeface="+mn-cs"/>
+              </a:defRPr>
+            </a:lvl4pPr>
+            <a:lvl5pPr marL="2057400" indent="-228600" algn="l" defTabSz="914400" rtl="0" eaLnBrk="1" latinLnBrk="0" hangingPunct="1">
+              <a:spcBef>
+                <a:spcPct val="20000"/>
+              </a:spcBef>
+              <a:buFont typeface="Arial" pitchFamily="34" charset="0"/>
+              <a:buChar char="»"/>
+              <a:defRPr sz="2000" kern="1200">
+                <a:solidFill>
+                  <a:schemeClr val="tx1"/>
+                </a:solidFill>
+                <a:latin typeface="+mn-lt"/>
+                <a:ea typeface="+mn-ea"/>
+                <a:cs typeface="+mn-cs"/>
+              </a:defRPr>
+            </a:lvl5pPr>
+            <a:lvl6pPr marL="2514600" indent="-228600" algn="l" defTabSz="914400" rtl="0" eaLnBrk="1" latinLnBrk="0" hangingPunct="1">
+              <a:spcBef>
+                <a:spcPct val="20000"/>
+              </a:spcBef>
+              <a:buFont typeface="Arial" pitchFamily="34" charset="0"/>
+              <a:buChar char="•"/>
+              <a:defRPr sz="2000" kern="1200">
+                <a:solidFill>
+                  <a:schemeClr val="tx1"/>
+                </a:solidFill>
+                <a:latin typeface="+mn-lt"/>
+                <a:ea typeface="+mn-ea"/>
+                <a:cs typeface="+mn-cs"/>
+              </a:defRPr>
+            </a:lvl6pPr>
+            <a:lvl7pPr marL="2971800" indent="-228600" algn="l" defTabSz="914400" rtl="0" eaLnBrk="1" latinLnBrk="0" hangingPunct="1">
+              <a:spcBef>
+                <a:spcPct val="20000"/>
+              </a:spcBef>
+              <a:buFont typeface="Arial" pitchFamily="34" charset="0"/>
+              <a:buChar char="•"/>
+              <a:defRPr sz="2000" kern="1200">
+                <a:solidFill>
+                  <a:schemeClr val="tx1"/>
+                </a:solidFill>
+                <a:latin typeface="+mn-lt"/>
+                <a:ea typeface="+mn-ea"/>
+                <a:cs typeface="+mn-cs"/>
+              </a:defRPr>
+            </a:lvl7pPr>
+            <a:lvl8pPr marL="3429000" indent="-228600" algn="l" defTabSz="914400" rtl="0" eaLnBrk="1" latinLnBrk="0" hangingPunct="1">
+              <a:spcBef>
+                <a:spcPct val="20000"/>
+              </a:spcBef>
+              <a:buFont typeface="Arial" pitchFamily="34" charset="0"/>
+              <a:buChar char="•"/>
+              <a:defRPr sz="2000" kern="1200">
+                <a:solidFill>
+                  <a:schemeClr val="tx1"/>
+                </a:solidFill>
+                <a:latin typeface="+mn-lt"/>
+                <a:ea typeface="+mn-ea"/>
+                <a:cs typeface="+mn-cs"/>
+              </a:defRPr>
+            </a:lvl8pPr>
+            <a:lvl9pPr marL="3886200" indent="-228600" algn="l" defTabSz="914400" rtl="0" eaLnBrk="1" latinLnBrk="0" hangingPunct="1">
+              <a:spcBef>
+                <a:spcPct val="20000"/>
+              </a:spcBef>
+              <a:buFont typeface="Arial" pitchFamily="34" charset="0"/>
+              <a:buChar char="•"/>
+              <a:defRPr sz="2000" kern="1200">
+                <a:solidFill>
+                  <a:schemeClr val="tx1"/>
+                </a:solidFill>
+                <a:latin typeface="+mn-lt"/>
+                <a:ea typeface="+mn-ea"/>
+                <a:cs typeface="+mn-cs"/>
+              </a:defRPr>
+            </a:lvl9pPr>
+          </a:lstStyle>
+          <a:p>
+            <a:pPr marL="0" indent="0">
+              <a:buNone/>
+            </a:pPr>
+            <a:r>
+              <a:rPr lang="en-US" dirty="0">
+                <a:solidFill>
+                  <a:schemeClr val="bg1"/>
+                </a:solidFill>
+              </a:rPr>
+              <a:t> </a:t>
+            </a:r>
+            <a:r>
+              <a:rPr lang="en-US" b="1" dirty="0">
+                <a:solidFill>
+                  <a:schemeClr val="bg1"/>
+                </a:solidFill>
+              </a:rPr>
+              <a:t>4</a:t>
+            </a:r>
+          </a:p>
+        </p:txBody>
+      </p:sp>
+      <p:sp>
+        <p:nvSpPr>
+          <p:cNvPr id="12" name="TextBox 11"/>
+          <p:cNvSpPr txBox="1"/>
+          <p:nvPr/>
+        </p:nvSpPr>
+        <p:spPr>
+          <a:xfrm>
+            <a:off x="945356" y="4110100"/>
+            <a:ext cx="7284244" cy="523220"/>
+          </a:xfrm>
+          <a:prstGeom prst="rect">
+            <a:avLst/>
+          </a:prstGeom>
+          <a:noFill/>
+        </p:spPr>
+        <p:txBody>
+          <a:bodyPr wrap="square" rtlCol="0">
+            <a:spAutoFit/>
+          </a:bodyPr>
+          <a:lstStyle/>
+          <a:p>
+            <a:r>
+              <a:rPr lang="en-US" sz="2800" dirty="0" err="1"/>
+              <a:t>db.</a:t>
+            </a:r>
+            <a:r>
+              <a:rPr lang="en-US" sz="2800" i="1" dirty="0" err="1"/>
+              <a:t>collection</a:t>
+            </a:r>
+            <a:r>
+              <a:rPr lang="en-US" sz="2800" dirty="0" err="1"/>
+              <a:t>.</a:t>
+            </a:r>
+            <a:r>
+              <a:rPr lang="en-US" sz="2800" b="1" dirty="0" err="1"/>
+              <a:t>update</a:t>
+            </a:r>
+            <a:r>
+              <a:rPr lang="en-US" sz="2800" dirty="0"/>
+              <a:t>()    </a:t>
+            </a:r>
+            <a:r>
+              <a:rPr lang="en-US" sz="2800" dirty="0">
+                <a:solidFill>
+                  <a:srgbClr val="009444"/>
+                </a:solidFill>
+              </a:rPr>
+              <a:t>//Deprecation!</a:t>
+            </a:r>
+          </a:p>
+        </p:txBody>
+      </p:sp>
     </p:spTree>
+    <p:extLst>
+      <p:ext uri="{BB962C8B-B14F-4D97-AF65-F5344CB8AC3E}">
+        <p14:creationId xmlns:p14="http://schemas.microsoft.com/office/powerpoint/2010/main" val="100055512"/>
+      </p:ext>
+    </p:extLst>
   </p:cSld>
   <p:clrMapOvr>
     <a:masterClrMapping/>
@@ -10762,6 +13468,56 @@
           </a:p>
         </p:txBody>
       </p:sp>
+    </p:spTree>
+  </p:cSld>
+  <p:clrMapOvr>
+    <a:masterClrMapping/>
+  </p:clrMapOvr>
+</p:sld>
+</file>
+
+<file path=ppt/slides/slide20.xml><?xml version="1.0" encoding="utf-8"?>
+<p:sld xmlns:a="http://schemas.openxmlformats.org/drawingml/2006/main" xmlns:r="http://schemas.openxmlformats.org/officeDocument/2006/relationships" xmlns:p="http://schemas.openxmlformats.org/presentationml/2006/main">
+  <p:cSld>
+    <p:spTree>
+      <p:nvGrpSpPr>
+        <p:cNvPr id="1" name=""/>
+        <p:cNvGrpSpPr/>
+        <p:nvPr/>
+      </p:nvGrpSpPr>
+      <p:grpSpPr>
+        <a:xfrm>
+          <a:off x="0" y="0"/>
+          <a:ext cx="0" cy="0"/>
+          <a:chOff x="0" y="0"/>
+          <a:chExt cx="0" cy="0"/>
+        </a:xfrm>
+      </p:grpSpPr>
+    </p:spTree>
+  </p:cSld>
+  <p:clrMapOvr>
+    <a:masterClrMapping/>
+  </p:clrMapOvr>
+</p:sld>
+</file>
+
+<file path=ppt/slides/slide21.xml><?xml version="1.0" encoding="utf-8"?>
+<p:sld xmlns:a="http://schemas.openxmlformats.org/drawingml/2006/main" xmlns:r="http://schemas.openxmlformats.org/officeDocument/2006/relationships" xmlns:p="http://schemas.openxmlformats.org/presentationml/2006/main">
+  <p:cSld>
+    <p:spTree>
+      <p:nvGrpSpPr>
+        <p:cNvPr id="1" name=""/>
+        <p:cNvGrpSpPr/>
+        <p:nvPr/>
+      </p:nvGrpSpPr>
+      <p:grpSpPr>
+        <a:xfrm>
+          <a:off x="0" y="0"/>
+          <a:ext cx="0" cy="0"/>
+          <a:chOff x="0" y="0"/>
+          <a:chExt cx="0" cy="0"/>
+        </a:xfrm>
+      </p:grpSpPr>
     </p:spTree>
   </p:cSld>
   <p:clrMapOvr>
@@ -16385,15 +19141,6 @@
 </file>
 
 <file path=customXml/item1.xml><?xml version="1.0" encoding="utf-8"?>
-<?mso-contentType ?>
-<FormTemplates xmlns="http://schemas.microsoft.com/sharepoint/v3/contenttype/forms">
-  <Display>DocumentLibraryForm</Display>
-  <Edit>DocumentLibraryForm</Edit>
-  <New>DocumentLibraryForm</New>
-</FormTemplates>
-</file>
-
-<file path=customXml/item2.xml><?xml version="1.0" encoding="utf-8"?>
 <ct:contentTypeSchema xmlns:ct="http://schemas.microsoft.com/office/2006/metadata/contentType" xmlns:ma="http://schemas.microsoft.com/office/2006/metadata/properties/metaAttributes" ct:_="" ma:_="" ma:contentTypeName="Document" ma:contentTypeID="0x010100EF3E94E2ACCF6D4EAE5CDD73AD546E17" ma:contentTypeVersion="0" ma:contentTypeDescription="Create a new document." ma:contentTypeScope="" ma:versionID="bb1449a0cfc4203701bc69f953314dcb">
   <xsd:schema xmlns:xsd="http://www.w3.org/2001/XMLSchema" xmlns:p="http://schemas.microsoft.com/office/2006/metadata/properties" targetNamespace="http://schemas.microsoft.com/office/2006/metadata/properties" ma:root="true" ma:fieldsID="4aeb20c0e3442673af7ee10786458764">
     <xsd:element name="properties">
@@ -16442,6 +19189,15 @@
 </ct:contentTypeSchema>
 </file>
 
+<file path=customXml/item2.xml><?xml version="1.0" encoding="utf-8"?>
+<?mso-contentType ?>
+<FormTemplates xmlns="http://schemas.microsoft.com/sharepoint/v3/contenttype/forms">
+  <Display>DocumentLibraryForm</Display>
+  <Edit>DocumentLibraryForm</Edit>
+  <New>DocumentLibraryForm</New>
+</FormTemplates>
+</file>
+
 <file path=customXml/item3.xml><?xml version="1.0" encoding="utf-8"?>
 <p:properties xmlns:p="http://schemas.microsoft.com/office/2006/metadata/properties" xmlns:xsi="http://www.w3.org/2001/XMLSchema-instance">
   <documentManagement/>
@@ -16449,14 +19205,6 @@
 </file>
 
 <file path=customXml/itemProps1.xml><?xml version="1.0" encoding="utf-8"?>
-<ds:datastoreItem xmlns:ds="http://schemas.openxmlformats.org/officeDocument/2006/customXml" ds:itemID="{AF2462E9-E3C6-4B9B-800D-1AA92DB6FEE6}">
-  <ds:schemaRefs>
-    <ds:schemaRef ds:uri="http://schemas.microsoft.com/sharepoint/v3/contenttype/forms"/>
-  </ds:schemaRefs>
-</ds:datastoreItem>
-</file>
-
-<file path=customXml/itemProps2.xml><?xml version="1.0" encoding="utf-8"?>
 <ds:datastoreItem xmlns:ds="http://schemas.openxmlformats.org/officeDocument/2006/customXml" ds:itemID="{1FBAA56A-8348-4CD3-A624-434B0E404A2E}">
   <ds:schemaRefs>
     <ds:schemaRef ds:uri="http://schemas.microsoft.com/office/2006/metadata/contentType"/>
@@ -16467,6 +19215,14 @@
     <ds:schemaRef ds:uri="http://purl.org/dc/elements/1.1/"/>
     <ds:schemaRef ds:uri="http://purl.org/dc/terms/"/>
     <ds:schemaRef ds:uri="http://schemas.microsoft.com/office/internal/2005/internalDocumentation"/>
+  </ds:schemaRefs>
+</ds:datastoreItem>
+</file>
+
+<file path=customXml/itemProps2.xml><?xml version="1.0" encoding="utf-8"?>
+<ds:datastoreItem xmlns:ds="http://schemas.openxmlformats.org/officeDocument/2006/customXml" ds:itemID="{AF2462E9-E3C6-4B9B-800D-1AA92DB6FEE6}">
+  <ds:schemaRefs>
+    <ds:schemaRef ds:uri="http://schemas.microsoft.com/sharepoint/v3/contenttype/forms"/>
   </ds:schemaRefs>
 </ds:datastoreItem>
 </file>

</xml_diff>

<commit_message>
[db] update ppt for CRUD
</commit_message>
<xml_diff>
--- a/db/mongodb/2017/materials/MongoDB_CH2_CRUD.pptx
+++ b/db/mongodb/2017/materials/MongoDB_CH2_CRUD.pptx
@@ -8,7 +8,7 @@
     <p:sldMasterId id="2147483652" r:id="rId7"/>
   </p:sldMasterIdLst>
   <p:notesMasterIdLst>
-    <p:notesMasterId r:id="rId29"/>
+    <p:notesMasterId r:id="rId33"/>
   </p:notesMasterIdLst>
   <p:sldIdLst>
     <p:sldId id="281" r:id="rId8"/>
@@ -30,8 +30,12 @@
     <p:sldId id="410" r:id="rId24"/>
     <p:sldId id="411" r:id="rId25"/>
     <p:sldId id="412" r:id="rId26"/>
-    <p:sldId id="264" r:id="rId27"/>
-    <p:sldId id="265" r:id="rId28"/>
+    <p:sldId id="414" r:id="rId27"/>
+    <p:sldId id="413" r:id="rId28"/>
+    <p:sldId id="415" r:id="rId29"/>
+    <p:sldId id="416" r:id="rId30"/>
+    <p:sldId id="264" r:id="rId31"/>
+    <p:sldId id="265" r:id="rId32"/>
   </p:sldIdLst>
   <p:sldSz cx="9144000" cy="6858000" type="screen4x3"/>
   <p:notesSz cx="6858000" cy="9144000"/>
@@ -13493,6 +13497,1245 @@
           <a:chExt cx="0" cy="0"/>
         </a:xfrm>
       </p:grpSpPr>
+      <p:sp>
+        <p:nvSpPr>
+          <p:cNvPr id="2" name="Text Placeholder 1"/>
+          <p:cNvSpPr>
+            <a:spLocks noGrp="1"/>
+          </p:cNvSpPr>
+          <p:nvPr>
+            <p:ph type="body" sz="quarter" idx="13"/>
+          </p:nvPr>
+        </p:nvSpPr>
+        <p:spPr/>
+        <p:txBody>
+          <a:bodyPr/>
+          <a:lstStyle/>
+          <a:p>
+            <a:r>
+              <a:rPr lang="en-US" dirty="0"/>
+              <a:t>3</a:t>
+            </a:r>
+          </a:p>
+        </p:txBody>
+      </p:sp>
+      <p:sp>
+        <p:nvSpPr>
+          <p:cNvPr id="3" name="Text Placeholder 2"/>
+          <p:cNvSpPr>
+            <a:spLocks noGrp="1"/>
+          </p:cNvSpPr>
+          <p:nvPr>
+            <p:ph type="body" sz="quarter" idx="14"/>
+          </p:nvPr>
+        </p:nvSpPr>
+        <p:spPr/>
+        <p:txBody>
+          <a:bodyPr/>
+          <a:lstStyle/>
+          <a:p>
+            <a:r>
+              <a:rPr lang="en-US" altLang="zh-CN" dirty="0"/>
+              <a:t>Update</a:t>
+            </a:r>
+          </a:p>
+          <a:p>
+            <a:endParaRPr lang="en-US" dirty="0"/>
+          </a:p>
+          <a:p>
+            <a:endParaRPr lang="en-US" dirty="0"/>
+          </a:p>
+        </p:txBody>
+      </p:sp>
+      <p:sp>
+        <p:nvSpPr>
+          <p:cNvPr id="7" name="TextBox 2"/>
+          <p:cNvSpPr txBox="1">
+            <a:spLocks noChangeArrowheads="1"/>
+          </p:cNvSpPr>
+          <p:nvPr/>
+        </p:nvSpPr>
+        <p:spPr bwMode="auto">
+          <a:xfrm>
+            <a:off x="197643" y="1066800"/>
+            <a:ext cx="8824913" cy="954107"/>
+          </a:xfrm>
+          <a:prstGeom prst="rect">
+            <a:avLst/>
+          </a:prstGeom>
+          <a:noFill/>
+          <a:ln w="9525">
+            <a:noFill/>
+            <a:miter lim="800000"/>
+            <a:headEnd/>
+            <a:tailEnd/>
+          </a:ln>
+        </p:spPr>
+        <p:txBody>
+          <a:bodyPr>
+            <a:spAutoFit/>
+          </a:bodyPr>
+          <a:lstStyle>
+            <a:lvl1pPr eaLnBrk="0" hangingPunct="0">
+              <a:defRPr>
+                <a:solidFill>
+                  <a:schemeClr val="tx1"/>
+                </a:solidFill>
+                <a:latin typeface="Arial" charset="0"/>
+                <a:ea typeface="宋体" pitchFamily="2" charset="-122"/>
+              </a:defRPr>
+            </a:lvl1pPr>
+            <a:lvl2pPr marL="742950" indent="-285750" eaLnBrk="0" hangingPunct="0">
+              <a:defRPr>
+                <a:solidFill>
+                  <a:schemeClr val="tx1"/>
+                </a:solidFill>
+                <a:latin typeface="Arial" charset="0"/>
+                <a:ea typeface="宋体" pitchFamily="2" charset="-122"/>
+              </a:defRPr>
+            </a:lvl2pPr>
+            <a:lvl3pPr marL="1143000" indent="-228600" eaLnBrk="0" hangingPunct="0">
+              <a:defRPr>
+                <a:solidFill>
+                  <a:schemeClr val="tx1"/>
+                </a:solidFill>
+                <a:latin typeface="Arial" charset="0"/>
+                <a:ea typeface="宋体" pitchFamily="2" charset="-122"/>
+              </a:defRPr>
+            </a:lvl3pPr>
+            <a:lvl4pPr marL="1600200" indent="-228600" eaLnBrk="0" hangingPunct="0">
+              <a:defRPr>
+                <a:solidFill>
+                  <a:schemeClr val="tx1"/>
+                </a:solidFill>
+                <a:latin typeface="Arial" charset="0"/>
+                <a:ea typeface="宋体" pitchFamily="2" charset="-122"/>
+              </a:defRPr>
+            </a:lvl4pPr>
+            <a:lvl5pPr marL="2057400" indent="-228600" eaLnBrk="0" hangingPunct="0">
+              <a:defRPr>
+                <a:solidFill>
+                  <a:schemeClr val="tx1"/>
+                </a:solidFill>
+                <a:latin typeface="Arial" charset="0"/>
+                <a:ea typeface="宋体" pitchFamily="2" charset="-122"/>
+              </a:defRPr>
+            </a:lvl5pPr>
+            <a:lvl6pPr marL="2514600" indent="-228600" eaLnBrk="0" fontAlgn="base" hangingPunct="0">
+              <a:spcBef>
+                <a:spcPct val="0"/>
+              </a:spcBef>
+              <a:spcAft>
+                <a:spcPct val="0"/>
+              </a:spcAft>
+              <a:defRPr>
+                <a:solidFill>
+                  <a:schemeClr val="tx1"/>
+                </a:solidFill>
+                <a:latin typeface="Arial" charset="0"/>
+                <a:ea typeface="宋体" pitchFamily="2" charset="-122"/>
+              </a:defRPr>
+            </a:lvl6pPr>
+            <a:lvl7pPr marL="2971800" indent="-228600" eaLnBrk="0" fontAlgn="base" hangingPunct="0">
+              <a:spcBef>
+                <a:spcPct val="0"/>
+              </a:spcBef>
+              <a:spcAft>
+                <a:spcPct val="0"/>
+              </a:spcAft>
+              <a:defRPr>
+                <a:solidFill>
+                  <a:schemeClr val="tx1"/>
+                </a:solidFill>
+                <a:latin typeface="Arial" charset="0"/>
+                <a:ea typeface="宋体" pitchFamily="2" charset="-122"/>
+              </a:defRPr>
+            </a:lvl7pPr>
+            <a:lvl8pPr marL="3429000" indent="-228600" eaLnBrk="0" fontAlgn="base" hangingPunct="0">
+              <a:spcBef>
+                <a:spcPct val="0"/>
+              </a:spcBef>
+              <a:spcAft>
+                <a:spcPct val="0"/>
+              </a:spcAft>
+              <a:defRPr>
+                <a:solidFill>
+                  <a:schemeClr val="tx1"/>
+                </a:solidFill>
+                <a:latin typeface="Arial" charset="0"/>
+                <a:ea typeface="宋体" pitchFamily="2" charset="-122"/>
+              </a:defRPr>
+            </a:lvl8pPr>
+            <a:lvl9pPr marL="3886200" indent="-228600" eaLnBrk="0" fontAlgn="base" hangingPunct="0">
+              <a:spcBef>
+                <a:spcPct val="0"/>
+              </a:spcBef>
+              <a:spcAft>
+                <a:spcPct val="0"/>
+              </a:spcAft>
+              <a:defRPr>
+                <a:solidFill>
+                  <a:schemeClr val="tx1"/>
+                </a:solidFill>
+                <a:latin typeface="Arial" charset="0"/>
+                <a:ea typeface="宋体" pitchFamily="2" charset="-122"/>
+              </a:defRPr>
+            </a:lvl9pPr>
+          </a:lstStyle>
+          <a:p>
+            <a:pPr eaLnBrk="1" hangingPunct="1"/>
+            <a:r>
+              <a:rPr lang="en-US" altLang="zh-CN" sz="2800" dirty="0">
+                <a:latin typeface="微软雅黑" panose="020B0503020204020204" pitchFamily="34" charset="-122"/>
+                <a:ea typeface="微软雅黑" panose="020B0503020204020204" pitchFamily="34" charset="-122"/>
+              </a:rPr>
+              <a:t>Test data:</a:t>
+            </a:r>
+          </a:p>
+          <a:p>
+            <a:pPr eaLnBrk="1" hangingPunct="1"/>
+            <a:endParaRPr lang="en-US" altLang="zh-CN" sz="2800" dirty="0">
+              <a:solidFill>
+                <a:schemeClr val="bg1"/>
+              </a:solidFill>
+              <a:latin typeface="微软雅黑" pitchFamily="34" charset="-122"/>
+              <a:ea typeface="微软雅黑" pitchFamily="34" charset="-122"/>
+            </a:endParaRPr>
+          </a:p>
+        </p:txBody>
+      </p:sp>
+      <p:pic>
+        <p:nvPicPr>
+          <p:cNvPr id="6" name="Picture 5"/>
+          <p:cNvPicPr>
+            <a:picLocks noChangeAspect="1"/>
+          </p:cNvPicPr>
+          <p:nvPr/>
+        </p:nvPicPr>
+        <p:blipFill>
+          <a:blip r:embed="rId2"/>
+          <a:stretch>
+            <a:fillRect/>
+          </a:stretch>
+        </p:blipFill>
+        <p:spPr>
+          <a:xfrm>
+            <a:off x="197642" y="1600200"/>
+            <a:ext cx="6812757" cy="5058834"/>
+          </a:xfrm>
+          <a:prstGeom prst="rect">
+            <a:avLst/>
+          </a:prstGeom>
+        </p:spPr>
+      </p:pic>
+    </p:spTree>
+    <p:extLst>
+      <p:ext uri="{BB962C8B-B14F-4D97-AF65-F5344CB8AC3E}">
+        <p14:creationId xmlns:p14="http://schemas.microsoft.com/office/powerpoint/2010/main" val="281371793"/>
+      </p:ext>
+    </p:extLst>
+  </p:cSld>
+  <p:clrMapOvr>
+    <a:masterClrMapping/>
+  </p:clrMapOvr>
+</p:sld>
+</file>
+
+<file path=ppt/slides/slide21.xml><?xml version="1.0" encoding="utf-8"?>
+<p:sld xmlns:a="http://schemas.openxmlformats.org/drawingml/2006/main" xmlns:r="http://schemas.openxmlformats.org/officeDocument/2006/relationships" xmlns:p="http://schemas.openxmlformats.org/presentationml/2006/main">
+  <p:cSld>
+    <p:spTree>
+      <p:nvGrpSpPr>
+        <p:cNvPr id="1" name=""/>
+        <p:cNvGrpSpPr/>
+        <p:nvPr/>
+      </p:nvGrpSpPr>
+      <p:grpSpPr>
+        <a:xfrm>
+          <a:off x="0" y="0"/>
+          <a:ext cx="0" cy="0"/>
+          <a:chOff x="0" y="0"/>
+          <a:chExt cx="0" cy="0"/>
+        </a:xfrm>
+      </p:grpSpPr>
+      <p:sp>
+        <p:nvSpPr>
+          <p:cNvPr id="2" name="Text Placeholder 1"/>
+          <p:cNvSpPr>
+            <a:spLocks noGrp="1"/>
+          </p:cNvSpPr>
+          <p:nvPr>
+            <p:ph type="body" sz="quarter" idx="13"/>
+          </p:nvPr>
+        </p:nvSpPr>
+        <p:spPr/>
+        <p:txBody>
+          <a:bodyPr/>
+          <a:lstStyle/>
+          <a:p>
+            <a:r>
+              <a:rPr lang="en-US" dirty="0"/>
+              <a:t>3</a:t>
+            </a:r>
+          </a:p>
+        </p:txBody>
+      </p:sp>
+      <p:sp>
+        <p:nvSpPr>
+          <p:cNvPr id="3" name="Text Placeholder 2"/>
+          <p:cNvSpPr>
+            <a:spLocks noGrp="1"/>
+          </p:cNvSpPr>
+          <p:nvPr>
+            <p:ph type="body" sz="quarter" idx="14"/>
+          </p:nvPr>
+        </p:nvSpPr>
+        <p:spPr/>
+        <p:txBody>
+          <a:bodyPr/>
+          <a:lstStyle/>
+          <a:p>
+            <a:r>
+              <a:rPr lang="en-US" altLang="zh-CN" dirty="0"/>
+              <a:t>Update</a:t>
+            </a:r>
+          </a:p>
+          <a:p>
+            <a:endParaRPr lang="en-US" dirty="0"/>
+          </a:p>
+          <a:p>
+            <a:endParaRPr lang="en-US" dirty="0"/>
+          </a:p>
+        </p:txBody>
+      </p:sp>
+      <p:sp>
+        <p:nvSpPr>
+          <p:cNvPr id="7" name="TextBox 2"/>
+          <p:cNvSpPr txBox="1">
+            <a:spLocks noChangeArrowheads="1"/>
+          </p:cNvSpPr>
+          <p:nvPr/>
+        </p:nvSpPr>
+        <p:spPr bwMode="auto">
+          <a:xfrm>
+            <a:off x="197643" y="1066800"/>
+            <a:ext cx="8824913" cy="954107"/>
+          </a:xfrm>
+          <a:prstGeom prst="rect">
+            <a:avLst/>
+          </a:prstGeom>
+          <a:noFill/>
+          <a:ln w="9525">
+            <a:noFill/>
+            <a:miter lim="800000"/>
+            <a:headEnd/>
+            <a:tailEnd/>
+          </a:ln>
+        </p:spPr>
+        <p:txBody>
+          <a:bodyPr>
+            <a:spAutoFit/>
+          </a:bodyPr>
+          <a:lstStyle>
+            <a:lvl1pPr eaLnBrk="0" hangingPunct="0">
+              <a:defRPr>
+                <a:solidFill>
+                  <a:schemeClr val="tx1"/>
+                </a:solidFill>
+                <a:latin typeface="Arial" charset="0"/>
+                <a:ea typeface="宋体" pitchFamily="2" charset="-122"/>
+              </a:defRPr>
+            </a:lvl1pPr>
+            <a:lvl2pPr marL="742950" indent="-285750" eaLnBrk="0" hangingPunct="0">
+              <a:defRPr>
+                <a:solidFill>
+                  <a:schemeClr val="tx1"/>
+                </a:solidFill>
+                <a:latin typeface="Arial" charset="0"/>
+                <a:ea typeface="宋体" pitchFamily="2" charset="-122"/>
+              </a:defRPr>
+            </a:lvl2pPr>
+            <a:lvl3pPr marL="1143000" indent="-228600" eaLnBrk="0" hangingPunct="0">
+              <a:defRPr>
+                <a:solidFill>
+                  <a:schemeClr val="tx1"/>
+                </a:solidFill>
+                <a:latin typeface="Arial" charset="0"/>
+                <a:ea typeface="宋体" pitchFamily="2" charset="-122"/>
+              </a:defRPr>
+            </a:lvl3pPr>
+            <a:lvl4pPr marL="1600200" indent="-228600" eaLnBrk="0" hangingPunct="0">
+              <a:defRPr>
+                <a:solidFill>
+                  <a:schemeClr val="tx1"/>
+                </a:solidFill>
+                <a:latin typeface="Arial" charset="0"/>
+                <a:ea typeface="宋体" pitchFamily="2" charset="-122"/>
+              </a:defRPr>
+            </a:lvl4pPr>
+            <a:lvl5pPr marL="2057400" indent="-228600" eaLnBrk="0" hangingPunct="0">
+              <a:defRPr>
+                <a:solidFill>
+                  <a:schemeClr val="tx1"/>
+                </a:solidFill>
+                <a:latin typeface="Arial" charset="0"/>
+                <a:ea typeface="宋体" pitchFamily="2" charset="-122"/>
+              </a:defRPr>
+            </a:lvl5pPr>
+            <a:lvl6pPr marL="2514600" indent="-228600" eaLnBrk="0" fontAlgn="base" hangingPunct="0">
+              <a:spcBef>
+                <a:spcPct val="0"/>
+              </a:spcBef>
+              <a:spcAft>
+                <a:spcPct val="0"/>
+              </a:spcAft>
+              <a:defRPr>
+                <a:solidFill>
+                  <a:schemeClr val="tx1"/>
+                </a:solidFill>
+                <a:latin typeface="Arial" charset="0"/>
+                <a:ea typeface="宋体" pitchFamily="2" charset="-122"/>
+              </a:defRPr>
+            </a:lvl6pPr>
+            <a:lvl7pPr marL="2971800" indent="-228600" eaLnBrk="0" fontAlgn="base" hangingPunct="0">
+              <a:spcBef>
+                <a:spcPct val="0"/>
+              </a:spcBef>
+              <a:spcAft>
+                <a:spcPct val="0"/>
+              </a:spcAft>
+              <a:defRPr>
+                <a:solidFill>
+                  <a:schemeClr val="tx1"/>
+                </a:solidFill>
+                <a:latin typeface="Arial" charset="0"/>
+                <a:ea typeface="宋体" pitchFamily="2" charset="-122"/>
+              </a:defRPr>
+            </a:lvl7pPr>
+            <a:lvl8pPr marL="3429000" indent="-228600" eaLnBrk="0" fontAlgn="base" hangingPunct="0">
+              <a:spcBef>
+                <a:spcPct val="0"/>
+              </a:spcBef>
+              <a:spcAft>
+                <a:spcPct val="0"/>
+              </a:spcAft>
+              <a:defRPr>
+                <a:solidFill>
+                  <a:schemeClr val="tx1"/>
+                </a:solidFill>
+                <a:latin typeface="Arial" charset="0"/>
+                <a:ea typeface="宋体" pitchFamily="2" charset="-122"/>
+              </a:defRPr>
+            </a:lvl8pPr>
+            <a:lvl9pPr marL="3886200" indent="-228600" eaLnBrk="0" fontAlgn="base" hangingPunct="0">
+              <a:spcBef>
+                <a:spcPct val="0"/>
+              </a:spcBef>
+              <a:spcAft>
+                <a:spcPct val="0"/>
+              </a:spcAft>
+              <a:defRPr>
+                <a:solidFill>
+                  <a:schemeClr val="tx1"/>
+                </a:solidFill>
+                <a:latin typeface="Arial" charset="0"/>
+                <a:ea typeface="宋体" pitchFamily="2" charset="-122"/>
+              </a:defRPr>
+            </a:lvl9pPr>
+          </a:lstStyle>
+          <a:p>
+            <a:pPr eaLnBrk="1" hangingPunct="1"/>
+            <a:r>
+              <a:rPr lang="en-US" altLang="zh-CN" sz="2800" dirty="0">
+                <a:latin typeface="微软雅黑" panose="020B0503020204020204" pitchFamily="34" charset="-122"/>
+                <a:ea typeface="微软雅黑" panose="020B0503020204020204" pitchFamily="34" charset="-122"/>
+              </a:rPr>
+              <a:t>Insert Single document:</a:t>
+            </a:r>
+          </a:p>
+          <a:p>
+            <a:pPr eaLnBrk="1" hangingPunct="1"/>
+            <a:endParaRPr lang="en-US" altLang="zh-CN" sz="2800" dirty="0">
+              <a:solidFill>
+                <a:schemeClr val="bg1"/>
+              </a:solidFill>
+              <a:latin typeface="微软雅黑" pitchFamily="34" charset="-122"/>
+              <a:ea typeface="微软雅黑" pitchFamily="34" charset="-122"/>
+            </a:endParaRPr>
+          </a:p>
+        </p:txBody>
+      </p:sp>
+      <p:sp>
+        <p:nvSpPr>
+          <p:cNvPr id="14" name="TextBox 2"/>
+          <p:cNvSpPr txBox="1">
+            <a:spLocks noChangeArrowheads="1"/>
+          </p:cNvSpPr>
+          <p:nvPr/>
+        </p:nvSpPr>
+        <p:spPr bwMode="auto">
+          <a:xfrm>
+            <a:off x="197643" y="4190030"/>
+            <a:ext cx="8824913" cy="954107"/>
+          </a:xfrm>
+          <a:prstGeom prst="rect">
+            <a:avLst/>
+          </a:prstGeom>
+          <a:noFill/>
+          <a:ln w="9525">
+            <a:noFill/>
+            <a:miter lim="800000"/>
+            <a:headEnd/>
+            <a:tailEnd/>
+          </a:ln>
+        </p:spPr>
+        <p:txBody>
+          <a:bodyPr>
+            <a:spAutoFit/>
+          </a:bodyPr>
+          <a:lstStyle>
+            <a:lvl1pPr eaLnBrk="0" hangingPunct="0">
+              <a:defRPr>
+                <a:solidFill>
+                  <a:schemeClr val="tx1"/>
+                </a:solidFill>
+                <a:latin typeface="Arial" charset="0"/>
+                <a:ea typeface="宋体" pitchFamily="2" charset="-122"/>
+              </a:defRPr>
+            </a:lvl1pPr>
+            <a:lvl2pPr marL="742950" indent="-285750" eaLnBrk="0" hangingPunct="0">
+              <a:defRPr>
+                <a:solidFill>
+                  <a:schemeClr val="tx1"/>
+                </a:solidFill>
+                <a:latin typeface="Arial" charset="0"/>
+                <a:ea typeface="宋体" pitchFamily="2" charset="-122"/>
+              </a:defRPr>
+            </a:lvl2pPr>
+            <a:lvl3pPr marL="1143000" indent="-228600" eaLnBrk="0" hangingPunct="0">
+              <a:defRPr>
+                <a:solidFill>
+                  <a:schemeClr val="tx1"/>
+                </a:solidFill>
+                <a:latin typeface="Arial" charset="0"/>
+                <a:ea typeface="宋体" pitchFamily="2" charset="-122"/>
+              </a:defRPr>
+            </a:lvl3pPr>
+            <a:lvl4pPr marL="1600200" indent="-228600" eaLnBrk="0" hangingPunct="0">
+              <a:defRPr>
+                <a:solidFill>
+                  <a:schemeClr val="tx1"/>
+                </a:solidFill>
+                <a:latin typeface="Arial" charset="0"/>
+                <a:ea typeface="宋体" pitchFamily="2" charset="-122"/>
+              </a:defRPr>
+            </a:lvl4pPr>
+            <a:lvl5pPr marL="2057400" indent="-228600" eaLnBrk="0" hangingPunct="0">
+              <a:defRPr>
+                <a:solidFill>
+                  <a:schemeClr val="tx1"/>
+                </a:solidFill>
+                <a:latin typeface="Arial" charset="0"/>
+                <a:ea typeface="宋体" pitchFamily="2" charset="-122"/>
+              </a:defRPr>
+            </a:lvl5pPr>
+            <a:lvl6pPr marL="2514600" indent="-228600" eaLnBrk="0" fontAlgn="base" hangingPunct="0">
+              <a:spcBef>
+                <a:spcPct val="0"/>
+              </a:spcBef>
+              <a:spcAft>
+                <a:spcPct val="0"/>
+              </a:spcAft>
+              <a:defRPr>
+                <a:solidFill>
+                  <a:schemeClr val="tx1"/>
+                </a:solidFill>
+                <a:latin typeface="Arial" charset="0"/>
+                <a:ea typeface="宋体" pitchFamily="2" charset="-122"/>
+              </a:defRPr>
+            </a:lvl6pPr>
+            <a:lvl7pPr marL="2971800" indent="-228600" eaLnBrk="0" fontAlgn="base" hangingPunct="0">
+              <a:spcBef>
+                <a:spcPct val="0"/>
+              </a:spcBef>
+              <a:spcAft>
+                <a:spcPct val="0"/>
+              </a:spcAft>
+              <a:defRPr>
+                <a:solidFill>
+                  <a:schemeClr val="tx1"/>
+                </a:solidFill>
+                <a:latin typeface="Arial" charset="0"/>
+                <a:ea typeface="宋体" pitchFamily="2" charset="-122"/>
+              </a:defRPr>
+            </a:lvl7pPr>
+            <a:lvl8pPr marL="3429000" indent="-228600" eaLnBrk="0" fontAlgn="base" hangingPunct="0">
+              <a:spcBef>
+                <a:spcPct val="0"/>
+              </a:spcBef>
+              <a:spcAft>
+                <a:spcPct val="0"/>
+              </a:spcAft>
+              <a:defRPr>
+                <a:solidFill>
+                  <a:schemeClr val="tx1"/>
+                </a:solidFill>
+                <a:latin typeface="Arial" charset="0"/>
+                <a:ea typeface="宋体" pitchFamily="2" charset="-122"/>
+              </a:defRPr>
+            </a:lvl8pPr>
+            <a:lvl9pPr marL="3886200" indent="-228600" eaLnBrk="0" fontAlgn="base" hangingPunct="0">
+              <a:spcBef>
+                <a:spcPct val="0"/>
+              </a:spcBef>
+              <a:spcAft>
+                <a:spcPct val="0"/>
+              </a:spcAft>
+              <a:defRPr>
+                <a:solidFill>
+                  <a:schemeClr val="tx1"/>
+                </a:solidFill>
+                <a:latin typeface="Arial" charset="0"/>
+                <a:ea typeface="宋体" pitchFamily="2" charset="-122"/>
+              </a:defRPr>
+            </a:lvl9pPr>
+          </a:lstStyle>
+          <a:p>
+            <a:pPr eaLnBrk="1" hangingPunct="1"/>
+            <a:r>
+              <a:rPr lang="en-US" altLang="zh-CN" sz="2800" dirty="0">
+                <a:latin typeface="微软雅黑" panose="020B0503020204020204" pitchFamily="34" charset="-122"/>
+                <a:ea typeface="微软雅黑" panose="020B0503020204020204" pitchFamily="34" charset="-122"/>
+              </a:rPr>
+              <a:t>MongoDB returns:</a:t>
+            </a:r>
+          </a:p>
+          <a:p>
+            <a:pPr eaLnBrk="1" hangingPunct="1"/>
+            <a:endParaRPr lang="en-US" altLang="zh-CN" sz="2800" dirty="0">
+              <a:solidFill>
+                <a:schemeClr val="bg1"/>
+              </a:solidFill>
+              <a:latin typeface="微软雅黑" pitchFamily="34" charset="-122"/>
+              <a:ea typeface="微软雅黑" pitchFamily="34" charset="-122"/>
+            </a:endParaRPr>
+          </a:p>
+        </p:txBody>
+      </p:sp>
+      <p:pic>
+        <p:nvPicPr>
+          <p:cNvPr id="4" name="Picture 3"/>
+          <p:cNvPicPr>
+            <a:picLocks noChangeAspect="1"/>
+          </p:cNvPicPr>
+          <p:nvPr/>
+        </p:nvPicPr>
+        <p:blipFill>
+          <a:blip r:embed="rId2"/>
+          <a:stretch>
+            <a:fillRect/>
+          </a:stretch>
+        </p:blipFill>
+        <p:spPr>
+          <a:xfrm>
+            <a:off x="197641" y="1543852"/>
+            <a:ext cx="6600059" cy="2646177"/>
+          </a:xfrm>
+          <a:prstGeom prst="rect">
+            <a:avLst/>
+          </a:prstGeom>
+        </p:spPr>
+      </p:pic>
+      <p:pic>
+        <p:nvPicPr>
+          <p:cNvPr id="10" name="Picture 9"/>
+          <p:cNvPicPr>
+            <a:picLocks noChangeAspect="1"/>
+          </p:cNvPicPr>
+          <p:nvPr/>
+        </p:nvPicPr>
+        <p:blipFill>
+          <a:blip r:embed="rId3"/>
+          <a:stretch>
+            <a:fillRect/>
+          </a:stretch>
+        </p:blipFill>
+        <p:spPr>
+          <a:xfrm>
+            <a:off x="197641" y="4681077"/>
+            <a:ext cx="5288759" cy="2031323"/>
+          </a:xfrm>
+          <a:prstGeom prst="rect">
+            <a:avLst/>
+          </a:prstGeom>
+        </p:spPr>
+      </p:pic>
+    </p:spTree>
+    <p:extLst>
+      <p:ext uri="{BB962C8B-B14F-4D97-AF65-F5344CB8AC3E}">
+        <p14:creationId xmlns:p14="http://schemas.microsoft.com/office/powerpoint/2010/main" val="1206468871"/>
+      </p:ext>
+    </p:extLst>
+  </p:cSld>
+  <p:clrMapOvr>
+    <a:masterClrMapping/>
+  </p:clrMapOvr>
+</p:sld>
+</file>
+
+<file path=ppt/slides/slide22.xml><?xml version="1.0" encoding="utf-8"?>
+<p:sld xmlns:a="http://schemas.openxmlformats.org/drawingml/2006/main" xmlns:r="http://schemas.openxmlformats.org/officeDocument/2006/relationships" xmlns:p="http://schemas.openxmlformats.org/presentationml/2006/main">
+  <p:cSld>
+    <p:spTree>
+      <p:nvGrpSpPr>
+        <p:cNvPr id="1" name=""/>
+        <p:cNvGrpSpPr/>
+        <p:nvPr/>
+      </p:nvGrpSpPr>
+      <p:grpSpPr>
+        <a:xfrm>
+          <a:off x="0" y="0"/>
+          <a:ext cx="0" cy="0"/>
+          <a:chOff x="0" y="0"/>
+          <a:chExt cx="0" cy="0"/>
+        </a:xfrm>
+      </p:grpSpPr>
+      <p:sp>
+        <p:nvSpPr>
+          <p:cNvPr id="2" name="Text Placeholder 1"/>
+          <p:cNvSpPr>
+            <a:spLocks noGrp="1"/>
+          </p:cNvSpPr>
+          <p:nvPr>
+            <p:ph type="body" sz="quarter" idx="13"/>
+          </p:nvPr>
+        </p:nvSpPr>
+        <p:spPr/>
+        <p:txBody>
+          <a:bodyPr/>
+          <a:lstStyle/>
+          <a:p>
+            <a:r>
+              <a:rPr lang="en-US" dirty="0"/>
+              <a:t>3</a:t>
+            </a:r>
+          </a:p>
+        </p:txBody>
+      </p:sp>
+      <p:sp>
+        <p:nvSpPr>
+          <p:cNvPr id="3" name="Text Placeholder 2"/>
+          <p:cNvSpPr>
+            <a:spLocks noGrp="1"/>
+          </p:cNvSpPr>
+          <p:nvPr>
+            <p:ph type="body" sz="quarter" idx="14"/>
+          </p:nvPr>
+        </p:nvSpPr>
+        <p:spPr/>
+        <p:txBody>
+          <a:bodyPr/>
+          <a:lstStyle/>
+          <a:p>
+            <a:r>
+              <a:rPr lang="en-US" altLang="zh-CN" dirty="0"/>
+              <a:t>Update</a:t>
+            </a:r>
+          </a:p>
+          <a:p>
+            <a:endParaRPr lang="en-US" dirty="0"/>
+          </a:p>
+          <a:p>
+            <a:endParaRPr lang="en-US" dirty="0"/>
+          </a:p>
+        </p:txBody>
+      </p:sp>
+      <p:sp>
+        <p:nvSpPr>
+          <p:cNvPr id="7" name="TextBox 2"/>
+          <p:cNvSpPr txBox="1">
+            <a:spLocks noChangeArrowheads="1"/>
+          </p:cNvSpPr>
+          <p:nvPr/>
+        </p:nvSpPr>
+        <p:spPr bwMode="auto">
+          <a:xfrm>
+            <a:off x="197643" y="1066800"/>
+            <a:ext cx="8824913" cy="954107"/>
+          </a:xfrm>
+          <a:prstGeom prst="rect">
+            <a:avLst/>
+          </a:prstGeom>
+          <a:noFill/>
+          <a:ln w="9525">
+            <a:noFill/>
+            <a:miter lim="800000"/>
+            <a:headEnd/>
+            <a:tailEnd/>
+          </a:ln>
+        </p:spPr>
+        <p:txBody>
+          <a:bodyPr>
+            <a:spAutoFit/>
+          </a:bodyPr>
+          <a:lstStyle>
+            <a:lvl1pPr eaLnBrk="0" hangingPunct="0">
+              <a:defRPr>
+                <a:solidFill>
+                  <a:schemeClr val="tx1"/>
+                </a:solidFill>
+                <a:latin typeface="Arial" charset="0"/>
+                <a:ea typeface="宋体" pitchFamily="2" charset="-122"/>
+              </a:defRPr>
+            </a:lvl1pPr>
+            <a:lvl2pPr marL="742950" indent="-285750" eaLnBrk="0" hangingPunct="0">
+              <a:defRPr>
+                <a:solidFill>
+                  <a:schemeClr val="tx1"/>
+                </a:solidFill>
+                <a:latin typeface="Arial" charset="0"/>
+                <a:ea typeface="宋体" pitchFamily="2" charset="-122"/>
+              </a:defRPr>
+            </a:lvl2pPr>
+            <a:lvl3pPr marL="1143000" indent="-228600" eaLnBrk="0" hangingPunct="0">
+              <a:defRPr>
+                <a:solidFill>
+                  <a:schemeClr val="tx1"/>
+                </a:solidFill>
+                <a:latin typeface="Arial" charset="0"/>
+                <a:ea typeface="宋体" pitchFamily="2" charset="-122"/>
+              </a:defRPr>
+            </a:lvl3pPr>
+            <a:lvl4pPr marL="1600200" indent="-228600" eaLnBrk="0" hangingPunct="0">
+              <a:defRPr>
+                <a:solidFill>
+                  <a:schemeClr val="tx1"/>
+                </a:solidFill>
+                <a:latin typeface="Arial" charset="0"/>
+                <a:ea typeface="宋体" pitchFamily="2" charset="-122"/>
+              </a:defRPr>
+            </a:lvl4pPr>
+            <a:lvl5pPr marL="2057400" indent="-228600" eaLnBrk="0" hangingPunct="0">
+              <a:defRPr>
+                <a:solidFill>
+                  <a:schemeClr val="tx1"/>
+                </a:solidFill>
+                <a:latin typeface="Arial" charset="0"/>
+                <a:ea typeface="宋体" pitchFamily="2" charset="-122"/>
+              </a:defRPr>
+            </a:lvl5pPr>
+            <a:lvl6pPr marL="2514600" indent="-228600" eaLnBrk="0" fontAlgn="base" hangingPunct="0">
+              <a:spcBef>
+                <a:spcPct val="0"/>
+              </a:spcBef>
+              <a:spcAft>
+                <a:spcPct val="0"/>
+              </a:spcAft>
+              <a:defRPr>
+                <a:solidFill>
+                  <a:schemeClr val="tx1"/>
+                </a:solidFill>
+                <a:latin typeface="Arial" charset="0"/>
+                <a:ea typeface="宋体" pitchFamily="2" charset="-122"/>
+              </a:defRPr>
+            </a:lvl6pPr>
+            <a:lvl7pPr marL="2971800" indent="-228600" eaLnBrk="0" fontAlgn="base" hangingPunct="0">
+              <a:spcBef>
+                <a:spcPct val="0"/>
+              </a:spcBef>
+              <a:spcAft>
+                <a:spcPct val="0"/>
+              </a:spcAft>
+              <a:defRPr>
+                <a:solidFill>
+                  <a:schemeClr val="tx1"/>
+                </a:solidFill>
+                <a:latin typeface="Arial" charset="0"/>
+                <a:ea typeface="宋体" pitchFamily="2" charset="-122"/>
+              </a:defRPr>
+            </a:lvl7pPr>
+            <a:lvl8pPr marL="3429000" indent="-228600" eaLnBrk="0" fontAlgn="base" hangingPunct="0">
+              <a:spcBef>
+                <a:spcPct val="0"/>
+              </a:spcBef>
+              <a:spcAft>
+                <a:spcPct val="0"/>
+              </a:spcAft>
+              <a:defRPr>
+                <a:solidFill>
+                  <a:schemeClr val="tx1"/>
+                </a:solidFill>
+                <a:latin typeface="Arial" charset="0"/>
+                <a:ea typeface="宋体" pitchFamily="2" charset="-122"/>
+              </a:defRPr>
+            </a:lvl8pPr>
+            <a:lvl9pPr marL="3886200" indent="-228600" eaLnBrk="0" fontAlgn="base" hangingPunct="0">
+              <a:spcBef>
+                <a:spcPct val="0"/>
+              </a:spcBef>
+              <a:spcAft>
+                <a:spcPct val="0"/>
+              </a:spcAft>
+              <a:defRPr>
+                <a:solidFill>
+                  <a:schemeClr val="tx1"/>
+                </a:solidFill>
+                <a:latin typeface="Arial" charset="0"/>
+                <a:ea typeface="宋体" pitchFamily="2" charset="-122"/>
+              </a:defRPr>
+            </a:lvl9pPr>
+          </a:lstStyle>
+          <a:p>
+            <a:pPr eaLnBrk="1" hangingPunct="1"/>
+            <a:r>
+              <a:rPr lang="en-US" altLang="zh-CN" sz="2800" dirty="0">
+                <a:latin typeface="微软雅黑" panose="020B0503020204020204" pitchFamily="34" charset="-122"/>
+                <a:ea typeface="微软雅黑" panose="020B0503020204020204" pitchFamily="34" charset="-122"/>
+              </a:rPr>
+              <a:t>Test data after update:</a:t>
+            </a:r>
+          </a:p>
+          <a:p>
+            <a:pPr eaLnBrk="1" hangingPunct="1"/>
+            <a:endParaRPr lang="en-US" altLang="zh-CN" sz="2800" dirty="0">
+              <a:solidFill>
+                <a:schemeClr val="bg1"/>
+              </a:solidFill>
+              <a:latin typeface="微软雅黑" pitchFamily="34" charset="-122"/>
+              <a:ea typeface="微软雅黑" pitchFamily="34" charset="-122"/>
+            </a:endParaRPr>
+          </a:p>
+        </p:txBody>
+      </p:sp>
+      <p:pic>
+        <p:nvPicPr>
+          <p:cNvPr id="6" name="Picture 5"/>
+          <p:cNvPicPr>
+            <a:picLocks noChangeAspect="1"/>
+          </p:cNvPicPr>
+          <p:nvPr/>
+        </p:nvPicPr>
+        <p:blipFill>
+          <a:blip r:embed="rId2"/>
+          <a:stretch>
+            <a:fillRect/>
+          </a:stretch>
+        </p:blipFill>
+        <p:spPr>
+          <a:xfrm>
+            <a:off x="304800" y="1600200"/>
+            <a:ext cx="7086600" cy="5093494"/>
+          </a:xfrm>
+          <a:prstGeom prst="rect">
+            <a:avLst/>
+          </a:prstGeom>
+        </p:spPr>
+      </p:pic>
+    </p:spTree>
+    <p:extLst>
+      <p:ext uri="{BB962C8B-B14F-4D97-AF65-F5344CB8AC3E}">
+        <p14:creationId xmlns:p14="http://schemas.microsoft.com/office/powerpoint/2010/main" val="1154450022"/>
+      </p:ext>
+    </p:extLst>
+  </p:cSld>
+  <p:clrMapOvr>
+    <a:masterClrMapping/>
+  </p:clrMapOvr>
+</p:sld>
+</file>
+
+<file path=ppt/slides/slide23.xml><?xml version="1.0" encoding="utf-8"?>
+<p:sld xmlns:a="http://schemas.openxmlformats.org/drawingml/2006/main" xmlns:r="http://schemas.openxmlformats.org/officeDocument/2006/relationships" xmlns:p="http://schemas.openxmlformats.org/presentationml/2006/main">
+  <p:cSld>
+    <p:spTree>
+      <p:nvGrpSpPr>
+        <p:cNvPr id="1" name=""/>
+        <p:cNvGrpSpPr/>
+        <p:nvPr/>
+      </p:nvGrpSpPr>
+      <p:grpSpPr>
+        <a:xfrm>
+          <a:off x="0" y="0"/>
+          <a:ext cx="0" cy="0"/>
+          <a:chOff x="0" y="0"/>
+          <a:chExt cx="0" cy="0"/>
+        </a:xfrm>
+      </p:grpSpPr>
+      <p:sp>
+        <p:nvSpPr>
+          <p:cNvPr id="2" name="Text Placeholder 1"/>
+          <p:cNvSpPr>
+            <a:spLocks noGrp="1"/>
+          </p:cNvSpPr>
+          <p:nvPr>
+            <p:ph type="body" sz="quarter" idx="13"/>
+          </p:nvPr>
+        </p:nvSpPr>
+        <p:spPr/>
+        <p:txBody>
+          <a:bodyPr/>
+          <a:lstStyle/>
+          <a:p>
+            <a:r>
+              <a:rPr lang="en-US" dirty="0"/>
+              <a:t>3</a:t>
+            </a:r>
+          </a:p>
+        </p:txBody>
+      </p:sp>
+      <p:sp>
+        <p:nvSpPr>
+          <p:cNvPr id="3" name="Text Placeholder 2"/>
+          <p:cNvSpPr>
+            <a:spLocks noGrp="1"/>
+          </p:cNvSpPr>
+          <p:nvPr>
+            <p:ph type="body" sz="quarter" idx="14"/>
+          </p:nvPr>
+        </p:nvSpPr>
+        <p:spPr/>
+        <p:txBody>
+          <a:bodyPr/>
+          <a:lstStyle/>
+          <a:p>
+            <a:r>
+              <a:rPr lang="en-US" altLang="zh-CN" dirty="0"/>
+              <a:t>Update</a:t>
+            </a:r>
+          </a:p>
+          <a:p>
+            <a:endParaRPr lang="en-US" dirty="0"/>
+          </a:p>
+          <a:p>
+            <a:endParaRPr lang="en-US" dirty="0"/>
+          </a:p>
+        </p:txBody>
+      </p:sp>
+      <p:sp>
+        <p:nvSpPr>
+          <p:cNvPr id="7" name="TextBox 2"/>
+          <p:cNvSpPr txBox="1">
+            <a:spLocks noChangeArrowheads="1"/>
+          </p:cNvSpPr>
+          <p:nvPr/>
+        </p:nvSpPr>
+        <p:spPr bwMode="auto">
+          <a:xfrm>
+            <a:off x="197643" y="1066800"/>
+            <a:ext cx="8824913" cy="523220"/>
+          </a:xfrm>
+          <a:prstGeom prst="rect">
+            <a:avLst/>
+          </a:prstGeom>
+          <a:noFill/>
+          <a:ln w="9525">
+            <a:noFill/>
+            <a:miter lim="800000"/>
+            <a:headEnd/>
+            <a:tailEnd/>
+          </a:ln>
+        </p:spPr>
+        <p:txBody>
+          <a:bodyPr>
+            <a:spAutoFit/>
+          </a:bodyPr>
+          <a:lstStyle>
+            <a:lvl1pPr eaLnBrk="0" hangingPunct="0">
+              <a:defRPr>
+                <a:solidFill>
+                  <a:schemeClr val="tx1"/>
+                </a:solidFill>
+                <a:latin typeface="Arial" charset="0"/>
+                <a:ea typeface="宋体" pitchFamily="2" charset="-122"/>
+              </a:defRPr>
+            </a:lvl1pPr>
+            <a:lvl2pPr marL="742950" indent="-285750" eaLnBrk="0" hangingPunct="0">
+              <a:defRPr>
+                <a:solidFill>
+                  <a:schemeClr val="tx1"/>
+                </a:solidFill>
+                <a:latin typeface="Arial" charset="0"/>
+                <a:ea typeface="宋体" pitchFamily="2" charset="-122"/>
+              </a:defRPr>
+            </a:lvl2pPr>
+            <a:lvl3pPr marL="1143000" indent="-228600" eaLnBrk="0" hangingPunct="0">
+              <a:defRPr>
+                <a:solidFill>
+                  <a:schemeClr val="tx1"/>
+                </a:solidFill>
+                <a:latin typeface="Arial" charset="0"/>
+                <a:ea typeface="宋体" pitchFamily="2" charset="-122"/>
+              </a:defRPr>
+            </a:lvl3pPr>
+            <a:lvl4pPr marL="1600200" indent="-228600" eaLnBrk="0" hangingPunct="0">
+              <a:defRPr>
+                <a:solidFill>
+                  <a:schemeClr val="tx1"/>
+                </a:solidFill>
+                <a:latin typeface="Arial" charset="0"/>
+                <a:ea typeface="宋体" pitchFamily="2" charset="-122"/>
+              </a:defRPr>
+            </a:lvl4pPr>
+            <a:lvl5pPr marL="2057400" indent="-228600" eaLnBrk="0" hangingPunct="0">
+              <a:defRPr>
+                <a:solidFill>
+                  <a:schemeClr val="tx1"/>
+                </a:solidFill>
+                <a:latin typeface="Arial" charset="0"/>
+                <a:ea typeface="宋体" pitchFamily="2" charset="-122"/>
+              </a:defRPr>
+            </a:lvl5pPr>
+            <a:lvl6pPr marL="2514600" indent="-228600" eaLnBrk="0" fontAlgn="base" hangingPunct="0">
+              <a:spcBef>
+                <a:spcPct val="0"/>
+              </a:spcBef>
+              <a:spcAft>
+                <a:spcPct val="0"/>
+              </a:spcAft>
+              <a:defRPr>
+                <a:solidFill>
+                  <a:schemeClr val="tx1"/>
+                </a:solidFill>
+                <a:latin typeface="Arial" charset="0"/>
+                <a:ea typeface="宋体" pitchFamily="2" charset="-122"/>
+              </a:defRPr>
+            </a:lvl6pPr>
+            <a:lvl7pPr marL="2971800" indent="-228600" eaLnBrk="0" fontAlgn="base" hangingPunct="0">
+              <a:spcBef>
+                <a:spcPct val="0"/>
+              </a:spcBef>
+              <a:spcAft>
+                <a:spcPct val="0"/>
+              </a:spcAft>
+              <a:defRPr>
+                <a:solidFill>
+                  <a:schemeClr val="tx1"/>
+                </a:solidFill>
+                <a:latin typeface="Arial" charset="0"/>
+                <a:ea typeface="宋体" pitchFamily="2" charset="-122"/>
+              </a:defRPr>
+            </a:lvl7pPr>
+            <a:lvl8pPr marL="3429000" indent="-228600" eaLnBrk="0" fontAlgn="base" hangingPunct="0">
+              <a:spcBef>
+                <a:spcPct val="0"/>
+              </a:spcBef>
+              <a:spcAft>
+                <a:spcPct val="0"/>
+              </a:spcAft>
+              <a:defRPr>
+                <a:solidFill>
+                  <a:schemeClr val="tx1"/>
+                </a:solidFill>
+                <a:latin typeface="Arial" charset="0"/>
+                <a:ea typeface="宋体" pitchFamily="2" charset="-122"/>
+              </a:defRPr>
+            </a:lvl8pPr>
+            <a:lvl9pPr marL="3886200" indent="-228600" eaLnBrk="0" fontAlgn="base" hangingPunct="0">
+              <a:spcBef>
+                <a:spcPct val="0"/>
+              </a:spcBef>
+              <a:spcAft>
+                <a:spcPct val="0"/>
+              </a:spcAft>
+              <a:defRPr>
+                <a:solidFill>
+                  <a:schemeClr val="tx1"/>
+                </a:solidFill>
+                <a:latin typeface="Arial" charset="0"/>
+                <a:ea typeface="宋体" pitchFamily="2" charset="-122"/>
+              </a:defRPr>
+            </a:lvl9pPr>
+          </a:lstStyle>
+          <a:p>
+            <a:pPr eaLnBrk="1" hangingPunct="1"/>
+            <a:r>
+              <a:rPr lang="en-US" altLang="zh-CN" sz="2800" dirty="0">
+                <a:latin typeface="微软雅黑" panose="020B0503020204020204" pitchFamily="34" charset="-122"/>
+                <a:ea typeface="微软雅黑" panose="020B0503020204020204" pitchFamily="34" charset="-122"/>
+              </a:rPr>
+              <a:t>Insert Single document – more complex:</a:t>
+            </a:r>
+          </a:p>
+        </p:txBody>
+      </p:sp>
+      <p:pic>
+        <p:nvPicPr>
+          <p:cNvPr id="5" name="Picture 4"/>
+          <p:cNvPicPr>
+            <a:picLocks noChangeAspect="1"/>
+          </p:cNvPicPr>
+          <p:nvPr/>
+        </p:nvPicPr>
+        <p:blipFill>
+          <a:blip r:embed="rId2"/>
+          <a:stretch>
+            <a:fillRect/>
+          </a:stretch>
+        </p:blipFill>
+        <p:spPr>
+          <a:xfrm>
+            <a:off x="197643" y="1597796"/>
+            <a:ext cx="5593557" cy="3352713"/>
+          </a:xfrm>
+          <a:prstGeom prst="rect">
+            <a:avLst/>
+          </a:prstGeom>
+        </p:spPr>
+      </p:pic>
+      <p:pic>
+        <p:nvPicPr>
+          <p:cNvPr id="6" name="Picture 5"/>
+          <p:cNvPicPr>
+            <a:picLocks noChangeAspect="1"/>
+          </p:cNvPicPr>
+          <p:nvPr/>
+        </p:nvPicPr>
+        <p:blipFill>
+          <a:blip r:embed="rId3"/>
+          <a:stretch>
+            <a:fillRect/>
+          </a:stretch>
+        </p:blipFill>
+        <p:spPr>
+          <a:xfrm>
+            <a:off x="152400" y="5105400"/>
+            <a:ext cx="8449056" cy="914400"/>
+          </a:xfrm>
+          <a:prstGeom prst="rect">
+            <a:avLst/>
+          </a:prstGeom>
+        </p:spPr>
+      </p:pic>
+    </p:spTree>
+    <p:extLst>
+      <p:ext uri="{BB962C8B-B14F-4D97-AF65-F5344CB8AC3E}">
+        <p14:creationId xmlns:p14="http://schemas.microsoft.com/office/powerpoint/2010/main" val="3344649224"/>
+      </p:ext>
+    </p:extLst>
+  </p:cSld>
+  <p:clrMapOvr>
+    <a:masterClrMapping/>
+  </p:clrMapOvr>
+</p:sld>
+</file>
+
+<file path=ppt/slides/slide24.xml><?xml version="1.0" encoding="utf-8"?>
+<p:sld xmlns:a="http://schemas.openxmlformats.org/drawingml/2006/main" xmlns:r="http://schemas.openxmlformats.org/officeDocument/2006/relationships" xmlns:p="http://schemas.openxmlformats.org/presentationml/2006/main">
+  <p:cSld>
+    <p:spTree>
+      <p:nvGrpSpPr>
+        <p:cNvPr id="1" name=""/>
+        <p:cNvGrpSpPr/>
+        <p:nvPr/>
+      </p:nvGrpSpPr>
+      <p:grpSpPr>
+        <a:xfrm>
+          <a:off x="0" y="0"/>
+          <a:ext cx="0" cy="0"/>
+          <a:chOff x="0" y="0"/>
+          <a:chExt cx="0" cy="0"/>
+        </a:xfrm>
+      </p:grpSpPr>
     </p:spTree>
   </p:cSld>
   <p:clrMapOvr>
@@ -13501,7 +14744,7 @@
 </p:sld>
 </file>
 
-<file path=ppt/slides/slide21.xml><?xml version="1.0" encoding="utf-8"?>
+<file path=ppt/slides/slide25.xml><?xml version="1.0" encoding="utf-8"?>
 <p:sld xmlns:a="http://schemas.openxmlformats.org/drawingml/2006/main" xmlns:r="http://schemas.openxmlformats.org/officeDocument/2006/relationships" xmlns:p="http://schemas.openxmlformats.org/presentationml/2006/main">
   <p:cSld>
     <p:spTree>
@@ -19141,6 +20384,21 @@
 </file>
 
 <file path=customXml/item1.xml><?xml version="1.0" encoding="utf-8"?>
+<p:properties xmlns:p="http://schemas.microsoft.com/office/2006/metadata/properties" xmlns:xsi="http://www.w3.org/2001/XMLSchema-instance">
+  <documentManagement/>
+</p:properties>
+</file>
+
+<file path=customXml/item2.xml><?xml version="1.0" encoding="utf-8"?>
+<?mso-contentType ?>
+<FormTemplates xmlns="http://schemas.microsoft.com/sharepoint/v3/contenttype/forms">
+  <Display>DocumentLibraryForm</Display>
+  <Edit>DocumentLibraryForm</Edit>
+  <New>DocumentLibraryForm</New>
+</FormTemplates>
+</file>
+
+<file path=customXml/item3.xml><?xml version="1.0" encoding="utf-8"?>
 <ct:contentTypeSchema xmlns:ct="http://schemas.microsoft.com/office/2006/metadata/contentType" xmlns:ma="http://schemas.microsoft.com/office/2006/metadata/properties/metaAttributes" ct:_="" ma:_="" ma:contentTypeName="Document" ma:contentTypeID="0x010100EF3E94E2ACCF6D4EAE5CDD73AD546E17" ma:contentTypeVersion="0" ma:contentTypeDescription="Create a new document." ma:contentTypeScope="" ma:versionID="bb1449a0cfc4203701bc69f953314dcb">
   <xsd:schema xmlns:xsd="http://www.w3.org/2001/XMLSchema" xmlns:p="http://schemas.microsoft.com/office/2006/metadata/properties" targetNamespace="http://schemas.microsoft.com/office/2006/metadata/properties" ma:root="true" ma:fieldsID="4aeb20c0e3442673af7ee10786458764">
     <xsd:element name="properties">
@@ -19189,32 +20447,16 @@
 </ct:contentTypeSchema>
 </file>
 
-<file path=customXml/item2.xml><?xml version="1.0" encoding="utf-8"?>
-<?mso-contentType ?>
-<FormTemplates xmlns="http://schemas.microsoft.com/sharepoint/v3/contenttype/forms">
-  <Display>DocumentLibraryForm</Display>
-  <Edit>DocumentLibraryForm</Edit>
-  <New>DocumentLibraryForm</New>
-</FormTemplates>
-</file>
-
-<file path=customXml/item3.xml><?xml version="1.0" encoding="utf-8"?>
-<p:properties xmlns:p="http://schemas.microsoft.com/office/2006/metadata/properties" xmlns:xsi="http://www.w3.org/2001/XMLSchema-instance">
-  <documentManagement/>
-</p:properties>
-</file>
-
 <file path=customXml/itemProps1.xml><?xml version="1.0" encoding="utf-8"?>
-<ds:datastoreItem xmlns:ds="http://schemas.openxmlformats.org/officeDocument/2006/customXml" ds:itemID="{1FBAA56A-8348-4CD3-A624-434B0E404A2E}">
+<ds:datastoreItem xmlns:ds="http://schemas.openxmlformats.org/officeDocument/2006/customXml" ds:itemID="{BC974159-165D-43A7-BAC0-2BE7E1872CAD}">
   <ds:schemaRefs>
-    <ds:schemaRef ds:uri="http://schemas.microsoft.com/office/2006/metadata/contentType"/>
-    <ds:schemaRef ds:uri="http://schemas.microsoft.com/office/2006/metadata/properties/metaAttributes"/>
-    <ds:schemaRef ds:uri="http://www.w3.org/2001/XMLSchema"/>
     <ds:schemaRef ds:uri="http://schemas.microsoft.com/office/2006/metadata/properties"/>
-    <ds:schemaRef ds:uri="http://schemas.openxmlformats.org/package/2006/metadata/core-properties"/>
     <ds:schemaRef ds:uri="http://purl.org/dc/elements/1.1/"/>
     <ds:schemaRef ds:uri="http://purl.org/dc/terms/"/>
-    <ds:schemaRef ds:uri="http://schemas.microsoft.com/office/internal/2005/internalDocumentation"/>
+    <ds:schemaRef ds:uri="http://schemas.microsoft.com/office/2006/documentManagement/types"/>
+    <ds:schemaRef ds:uri="http://purl.org/dc/dcmitype/"/>
+    <ds:schemaRef ds:uri="http://www.w3.org/XML/1998/namespace"/>
+    <ds:schemaRef ds:uri="http://schemas.openxmlformats.org/package/2006/metadata/core-properties"/>
   </ds:schemaRefs>
 </ds:datastoreItem>
 </file>
@@ -19228,15 +20470,16 @@
 </file>
 
 <file path=customXml/itemProps3.xml><?xml version="1.0" encoding="utf-8"?>
-<ds:datastoreItem xmlns:ds="http://schemas.openxmlformats.org/officeDocument/2006/customXml" ds:itemID="{BC974159-165D-43A7-BAC0-2BE7E1872CAD}">
+<ds:datastoreItem xmlns:ds="http://schemas.openxmlformats.org/officeDocument/2006/customXml" ds:itemID="{1FBAA56A-8348-4CD3-A624-434B0E404A2E}">
   <ds:schemaRefs>
+    <ds:schemaRef ds:uri="http://schemas.microsoft.com/office/2006/metadata/contentType"/>
+    <ds:schemaRef ds:uri="http://schemas.microsoft.com/office/2006/metadata/properties/metaAttributes"/>
+    <ds:schemaRef ds:uri="http://www.w3.org/2001/XMLSchema"/>
     <ds:schemaRef ds:uri="http://schemas.microsoft.com/office/2006/metadata/properties"/>
+    <ds:schemaRef ds:uri="http://schemas.openxmlformats.org/package/2006/metadata/core-properties"/>
     <ds:schemaRef ds:uri="http://purl.org/dc/elements/1.1/"/>
     <ds:schemaRef ds:uri="http://purl.org/dc/terms/"/>
-    <ds:schemaRef ds:uri="http://schemas.microsoft.com/office/2006/documentManagement/types"/>
-    <ds:schemaRef ds:uri="http://purl.org/dc/dcmitype/"/>
-    <ds:schemaRef ds:uri="http://www.w3.org/XML/1998/namespace"/>
-    <ds:schemaRef ds:uri="http://schemas.openxmlformats.org/package/2006/metadata/core-properties"/>
+    <ds:schemaRef ds:uri="http://schemas.microsoft.com/office/internal/2005/internalDocumentation"/>
   </ds:schemaRefs>
 </ds:datastoreItem>
 </file>
</xml_diff>